<commit_message>
try to use gensim
</commit_message>
<xml_diff>
--- a/Excel/2018_09_25進捗報告.pptx
+++ b/Excel/2018_09_25進捗報告.pptx
@@ -6,24 +6,25 @@
     <p:sldMasterId id="2147483672" r:id="rId2"/>
   </p:sldMasterIdLst>
   <p:notesMasterIdLst>
-    <p:notesMasterId r:id="rId18"/>
+    <p:notesMasterId r:id="rId19"/>
   </p:notesMasterIdLst>
   <p:sldIdLst>
     <p:sldId id="256" r:id="rId3"/>
-    <p:sldId id="257" r:id="rId4"/>
-    <p:sldId id="297" r:id="rId5"/>
-    <p:sldId id="328" r:id="rId6"/>
-    <p:sldId id="261" r:id="rId7"/>
-    <p:sldId id="264" r:id="rId8"/>
-    <p:sldId id="291" r:id="rId9"/>
-    <p:sldId id="329" r:id="rId10"/>
-    <p:sldId id="330" r:id="rId11"/>
-    <p:sldId id="331" r:id="rId12"/>
-    <p:sldId id="335" r:id="rId13"/>
-    <p:sldId id="334" r:id="rId14"/>
-    <p:sldId id="336" r:id="rId15"/>
+    <p:sldId id="297" r:id="rId4"/>
+    <p:sldId id="328" r:id="rId5"/>
+    <p:sldId id="261" r:id="rId6"/>
+    <p:sldId id="264" r:id="rId7"/>
+    <p:sldId id="291" r:id="rId8"/>
+    <p:sldId id="329" r:id="rId9"/>
+    <p:sldId id="330" r:id="rId10"/>
+    <p:sldId id="331" r:id="rId11"/>
+    <p:sldId id="335" r:id="rId12"/>
+    <p:sldId id="334" r:id="rId13"/>
+    <p:sldId id="336" r:id="rId14"/>
+    <p:sldId id="338" r:id="rId15"/>
     <p:sldId id="333" r:id="rId16"/>
-    <p:sldId id="332" r:id="rId17"/>
+    <p:sldId id="337" r:id="rId17"/>
+    <p:sldId id="332" r:id="rId18"/>
   </p:sldIdLst>
   <p:sldSz cx="9144000" cy="6858000" type="screen4x3"/>
   <p:notesSz cx="6858000" cy="9144000"/>
@@ -238,7 +239,7 @@
           <a:p>
             <a:fld id="{C5BC4A82-6AA5-4549-AC3A-5ED22DE856DB}" type="datetimeFigureOut">
               <a:rPr kumimoji="1" lang="ja-JP" altLang="en-US" smtClean="0"/>
-              <a:t>2018/9/22</a:t>
+              <a:t>2018/9/24</a:t>
             </a:fld>
             <a:endParaRPr kumimoji="1" lang="ja-JP" altLang="en-US"/>
           </a:p>
@@ -790,7 +791,7 @@
                 <a:tabLst/>
                 <a:defRPr/>
               </a:pPr>
-              <a:t>6</a:t>
+              <a:t>5</a:t>
             </a:fld>
             <a:endParaRPr kumimoji="1" lang="ja-JP" altLang="en-US" sz="1200" b="0" i="0" u="none" strike="noStrike" kern="1200" cap="none" spc="0" normalizeH="0" baseline="0" noProof="0">
               <a:ln>
@@ -969,7 +970,7 @@
           <a:p>
             <a:fld id="{4310C514-BCC6-43AD-A81A-D8940CAB7938}" type="datetimeFigureOut">
               <a:rPr kumimoji="1" lang="ja-JP" altLang="en-US" smtClean="0"/>
-              <a:t>2018/9/22</a:t>
+              <a:t>2018/9/24</a:t>
             </a:fld>
             <a:endParaRPr kumimoji="1" lang="ja-JP" altLang="en-US"/>
           </a:p>
@@ -1199,7 +1200,7 @@
           <a:p>
             <a:fld id="{4310C514-BCC6-43AD-A81A-D8940CAB7938}" type="datetimeFigureOut">
               <a:rPr kumimoji="1" lang="ja-JP" altLang="en-US" smtClean="0"/>
-              <a:t>2018/9/22</a:t>
+              <a:t>2018/9/24</a:t>
             </a:fld>
             <a:endParaRPr kumimoji="1" lang="ja-JP" altLang="en-US"/>
           </a:p>
@@ -1439,7 +1440,7 @@
           <a:p>
             <a:fld id="{4310C514-BCC6-43AD-A81A-D8940CAB7938}" type="datetimeFigureOut">
               <a:rPr kumimoji="1" lang="ja-JP" altLang="en-US" smtClean="0"/>
-              <a:t>2018/9/22</a:t>
+              <a:t>2018/9/24</a:t>
             </a:fld>
             <a:endParaRPr kumimoji="1" lang="ja-JP" altLang="en-US"/>
           </a:p>
@@ -1738,7 +1739,7 @@
           <a:p>
             <a:fld id="{3DCACBF8-2627-4B05-8153-B57084BA0D00}" type="datetimeFigureOut">
               <a:rPr kumimoji="1" lang="ja-JP" altLang="en-US" smtClean="0"/>
-              <a:t>2018/9/22</a:t>
+              <a:t>2018/9/24</a:t>
             </a:fld>
             <a:endParaRPr kumimoji="1" lang="ja-JP" altLang="en-US"/>
           </a:p>
@@ -1984,7 +1985,7 @@
           <a:p>
             <a:fld id="{3DCACBF8-2627-4B05-8153-B57084BA0D00}" type="datetimeFigureOut">
               <a:rPr kumimoji="1" lang="ja-JP" altLang="en-US" smtClean="0"/>
-              <a:t>2018/9/22</a:t>
+              <a:t>2018/9/24</a:t>
             </a:fld>
             <a:endParaRPr kumimoji="1" lang="ja-JP" altLang="en-US"/>
           </a:p>
@@ -2327,7 +2328,7 @@
           <a:p>
             <a:fld id="{3DCACBF8-2627-4B05-8153-B57084BA0D00}" type="datetimeFigureOut">
               <a:rPr kumimoji="1" lang="ja-JP" altLang="en-US" smtClean="0"/>
-              <a:t>2018/9/22</a:t>
+              <a:t>2018/9/24</a:t>
             </a:fld>
             <a:endParaRPr kumimoji="1" lang="ja-JP" altLang="en-US"/>
           </a:p>
@@ -2666,7 +2667,7 @@
           <a:p>
             <a:fld id="{3DCACBF8-2627-4B05-8153-B57084BA0D00}" type="datetimeFigureOut">
               <a:rPr kumimoji="1" lang="ja-JP" altLang="en-US" smtClean="0"/>
-              <a:t>2018/9/22</a:t>
+              <a:t>2018/9/24</a:t>
             </a:fld>
             <a:endParaRPr kumimoji="1" lang="ja-JP" altLang="en-US"/>
           </a:p>
@@ -3109,7 +3110,7 @@
           <a:p>
             <a:fld id="{3DCACBF8-2627-4B05-8153-B57084BA0D00}" type="datetimeFigureOut">
               <a:rPr kumimoji="1" lang="ja-JP" altLang="en-US" smtClean="0"/>
-              <a:t>2018/9/22</a:t>
+              <a:t>2018/9/24</a:t>
             </a:fld>
             <a:endParaRPr kumimoji="1" lang="ja-JP" altLang="en-US"/>
           </a:p>
@@ -3227,7 +3228,7 @@
           <a:p>
             <a:fld id="{3DCACBF8-2627-4B05-8153-B57084BA0D00}" type="datetimeFigureOut">
               <a:rPr kumimoji="1" lang="ja-JP" altLang="en-US" smtClean="0"/>
-              <a:t>2018/9/22</a:t>
+              <a:t>2018/9/24</a:t>
             </a:fld>
             <a:endParaRPr kumimoji="1" lang="ja-JP" altLang="en-US"/>
           </a:p>
@@ -3398,7 +3399,7 @@
           <a:p>
             <a:fld id="{3DCACBF8-2627-4B05-8153-B57084BA0D00}" type="datetimeFigureOut">
               <a:rPr kumimoji="1" lang="ja-JP" altLang="en-US" smtClean="0"/>
-              <a:t>2018/9/22</a:t>
+              <a:t>2018/9/24</a:t>
             </a:fld>
             <a:endParaRPr kumimoji="1" lang="ja-JP" altLang="en-US"/>
           </a:p>
@@ -3784,7 +3785,7 @@
           <a:p>
             <a:fld id="{3DCACBF8-2627-4B05-8153-B57084BA0D00}" type="datetimeFigureOut">
               <a:rPr kumimoji="1" lang="ja-JP" altLang="en-US" smtClean="0"/>
-              <a:t>2018/9/22</a:t>
+              <a:t>2018/9/24</a:t>
             </a:fld>
             <a:endParaRPr kumimoji="1" lang="ja-JP" altLang="en-US"/>
           </a:p>
@@ -4033,7 +4034,7 @@
           <a:p>
             <a:fld id="{4310C514-BCC6-43AD-A81A-D8940CAB7938}" type="datetimeFigureOut">
               <a:rPr kumimoji="1" lang="ja-JP" altLang="en-US" smtClean="0"/>
-              <a:t>2018/9/22</a:t>
+              <a:t>2018/9/24</a:t>
             </a:fld>
             <a:endParaRPr kumimoji="1" lang="ja-JP" altLang="en-US"/>
           </a:p>
@@ -4401,7 +4402,7 @@
           <a:p>
             <a:fld id="{3DCACBF8-2627-4B05-8153-B57084BA0D00}" type="datetimeFigureOut">
               <a:rPr kumimoji="1" lang="ja-JP" altLang="en-US" smtClean="0"/>
-              <a:t>2018/9/22</a:t>
+              <a:t>2018/9/24</a:t>
             </a:fld>
             <a:endParaRPr kumimoji="1" lang="ja-JP" altLang="en-US"/>
           </a:p>
@@ -4603,7 +4604,7 @@
           <a:p>
             <a:fld id="{3DCACBF8-2627-4B05-8153-B57084BA0D00}" type="datetimeFigureOut">
               <a:rPr kumimoji="1" lang="ja-JP" altLang="en-US" smtClean="0"/>
-              <a:t>2018/9/22</a:t>
+              <a:t>2018/9/24</a:t>
             </a:fld>
             <a:endParaRPr kumimoji="1" lang="ja-JP" altLang="en-US"/>
           </a:p>
@@ -4927,7 +4928,7 @@
           <a:p>
             <a:fld id="{3DCACBF8-2627-4B05-8153-B57084BA0D00}" type="datetimeFigureOut">
               <a:rPr kumimoji="1" lang="ja-JP" altLang="en-US" smtClean="0"/>
-              <a:t>2018/9/22</a:t>
+              <a:t>2018/9/24</a:t>
             </a:fld>
             <a:endParaRPr kumimoji="1" lang="ja-JP" altLang="en-US"/>
           </a:p>
@@ -5190,7 +5191,7 @@
           <a:p>
             <a:fld id="{4310C514-BCC6-43AD-A81A-D8940CAB7938}" type="datetimeFigureOut">
               <a:rPr kumimoji="1" lang="ja-JP" altLang="en-US" smtClean="0"/>
-              <a:t>2018/9/22</a:t>
+              <a:t>2018/9/24</a:t>
             </a:fld>
             <a:endParaRPr kumimoji="1" lang="ja-JP" altLang="en-US"/>
           </a:p>
@@ -5519,7 +5520,7 @@
           <a:p>
             <a:fld id="{4310C514-BCC6-43AD-A81A-D8940CAB7938}" type="datetimeFigureOut">
               <a:rPr kumimoji="1" lang="ja-JP" altLang="en-US" smtClean="0"/>
-              <a:t>2018/9/22</a:t>
+              <a:t>2018/9/24</a:t>
             </a:fld>
             <a:endParaRPr kumimoji="1" lang="ja-JP" altLang="en-US"/>
           </a:p>
@@ -5995,7 +5996,7 @@
           <a:p>
             <a:fld id="{4310C514-BCC6-43AD-A81A-D8940CAB7938}" type="datetimeFigureOut">
               <a:rPr kumimoji="1" lang="ja-JP" altLang="en-US" smtClean="0"/>
-              <a:t>2018/9/22</a:t>
+              <a:t>2018/9/24</a:t>
             </a:fld>
             <a:endParaRPr kumimoji="1" lang="ja-JP" altLang="en-US"/>
           </a:p>
@@ -6136,7 +6137,7 @@
           <a:p>
             <a:fld id="{4310C514-BCC6-43AD-A81A-D8940CAB7938}" type="datetimeFigureOut">
               <a:rPr kumimoji="1" lang="ja-JP" altLang="en-US" smtClean="0"/>
-              <a:t>2018/9/22</a:t>
+              <a:t>2018/9/24</a:t>
             </a:fld>
             <a:endParaRPr kumimoji="1" lang="ja-JP" altLang="en-US"/>
           </a:p>
@@ -6249,7 +6250,7 @@
           <a:p>
             <a:fld id="{4310C514-BCC6-43AD-A81A-D8940CAB7938}" type="datetimeFigureOut">
               <a:rPr kumimoji="1" lang="ja-JP" altLang="en-US" smtClean="0"/>
-              <a:t>2018/9/22</a:t>
+              <a:t>2018/9/24</a:t>
             </a:fld>
             <a:endParaRPr kumimoji="1" lang="ja-JP" altLang="en-US"/>
           </a:p>
@@ -6592,7 +6593,7 @@
           <a:p>
             <a:fld id="{4310C514-BCC6-43AD-A81A-D8940CAB7938}" type="datetimeFigureOut">
               <a:rPr kumimoji="1" lang="ja-JP" altLang="en-US" smtClean="0"/>
-              <a:t>2018/9/22</a:t>
+              <a:t>2018/9/24</a:t>
             </a:fld>
             <a:endParaRPr kumimoji="1" lang="ja-JP" altLang="en-US"/>
           </a:p>
@@ -6880,7 +6881,7 @@
           <a:p>
             <a:fld id="{4310C514-BCC6-43AD-A81A-D8940CAB7938}" type="datetimeFigureOut">
               <a:rPr kumimoji="1" lang="ja-JP" altLang="en-US" smtClean="0"/>
-              <a:t>2018/9/22</a:t>
+              <a:t>2018/9/24</a:t>
             </a:fld>
             <a:endParaRPr kumimoji="1" lang="ja-JP" altLang="en-US"/>
           </a:p>
@@ -7153,7 +7154,7 @@
           <a:p>
             <a:fld id="{4310C514-BCC6-43AD-A81A-D8940CAB7938}" type="datetimeFigureOut">
               <a:rPr kumimoji="1" lang="ja-JP" altLang="en-US" smtClean="0"/>
-              <a:t>2018/9/22</a:t>
+              <a:t>2018/9/24</a:t>
             </a:fld>
             <a:endParaRPr kumimoji="1" lang="ja-JP" altLang="en-US"/>
           </a:p>
@@ -7811,7 +7812,7 @@
           <a:p>
             <a:fld id="{4310C514-BCC6-43AD-A81A-D8940CAB7938}" type="datetimeFigureOut">
               <a:rPr kumimoji="1" lang="ja-JP" altLang="en-US" smtClean="0"/>
-              <a:t>2018/9/22</a:t>
+              <a:t>2018/9/24</a:t>
             </a:fld>
             <a:endParaRPr kumimoji="1" lang="ja-JP" altLang="en-US"/>
           </a:p>
@@ -8549,444 +8550,6 @@
       </p:grpSpPr>
       <p:sp>
         <p:nvSpPr>
-          <p:cNvPr id="5" name="タイトル 4">
-            <a:extLst>
-              <a:ext uri="{FF2B5EF4-FFF2-40B4-BE49-F238E27FC236}">
-                <a16:creationId xmlns:a16="http://schemas.microsoft.com/office/drawing/2014/main" id="{5F6173A6-3DEB-47BF-A785-55C2FE7C3154}"/>
-              </a:ext>
-            </a:extLst>
-          </p:cNvPr>
-          <p:cNvSpPr>
-            <a:spLocks noGrp="1"/>
-          </p:cNvSpPr>
-          <p:nvPr>
-            <p:ph type="title"/>
-          </p:nvPr>
-        </p:nvSpPr>
-        <p:spPr/>
-        <p:txBody>
-          <a:bodyPr>
-            <a:normAutofit/>
-          </a:bodyPr>
-          <a:lstStyle/>
-          <a:p>
-            <a:r>
-              <a:rPr lang="ja-JP" altLang="en-US" dirty="0"/>
-              <a:t>データのグルーピング方法</a:t>
-            </a:r>
-          </a:p>
-        </p:txBody>
-      </p:sp>
-      <p:pic>
-        <p:nvPicPr>
-          <p:cNvPr id="13" name="コンテンツ プレースホルダー 12">
-            <a:extLst>
-              <a:ext uri="{FF2B5EF4-FFF2-40B4-BE49-F238E27FC236}">
-                <a16:creationId xmlns:a16="http://schemas.microsoft.com/office/drawing/2014/main" id="{1B9A43DE-B636-414E-BFFE-47D7FA3C4C78}"/>
-              </a:ext>
-            </a:extLst>
-          </p:cNvPr>
-          <p:cNvPicPr>
-            <a:picLocks noGrp="1" noChangeAspect="1"/>
-          </p:cNvPicPr>
-          <p:nvPr>
-            <p:ph idx="1"/>
-          </p:nvPr>
-        </p:nvPicPr>
-        <p:blipFill>
-          <a:blip r:embed="rId2"/>
-          <a:stretch>
-            <a:fillRect/>
-          </a:stretch>
-        </p:blipFill>
-        <p:spPr>
-          <a:xfrm>
-            <a:off x="139700" y="1087410"/>
-            <a:ext cx="8864600" cy="1928661"/>
-          </a:xfrm>
-          <a:prstGeom prst="rect">
-            <a:avLst/>
-          </a:prstGeom>
-        </p:spPr>
-      </p:pic>
-      <p:sp>
-        <p:nvSpPr>
-          <p:cNvPr id="14" name="矢印: 下 13">
-            <a:extLst>
-              <a:ext uri="{FF2B5EF4-FFF2-40B4-BE49-F238E27FC236}">
-                <a16:creationId xmlns:a16="http://schemas.microsoft.com/office/drawing/2014/main" id="{5F59F43C-6636-4FF0-AB36-068513B4CEF4}"/>
-              </a:ext>
-            </a:extLst>
-          </p:cNvPr>
-          <p:cNvSpPr/>
-          <p:nvPr/>
-        </p:nvSpPr>
-        <p:spPr>
-          <a:xfrm rot="4110838">
-            <a:off x="4880475" y="1908560"/>
-            <a:ext cx="255030" cy="826327"/>
-          </a:xfrm>
-          <a:prstGeom prst="downArrow">
-            <a:avLst/>
-          </a:prstGeom>
-        </p:spPr>
-        <p:style>
-          <a:lnRef idx="2">
-            <a:schemeClr val="accent1">
-              <a:shade val="50000"/>
-            </a:schemeClr>
-          </a:lnRef>
-          <a:fillRef idx="1">
-            <a:schemeClr val="accent1"/>
-          </a:fillRef>
-          <a:effectRef idx="0">
-            <a:schemeClr val="accent1"/>
-          </a:effectRef>
-          <a:fontRef idx="minor">
-            <a:schemeClr val="lt1"/>
-          </a:fontRef>
-        </p:style>
-        <p:txBody>
-          <a:bodyPr rtlCol="0" anchor="ctr"/>
-          <a:lstStyle/>
-          <a:p>
-            <a:pPr algn="ctr"/>
-            <a:endParaRPr kumimoji="1" lang="ja-JP" altLang="en-US"/>
-          </a:p>
-        </p:txBody>
-      </p:sp>
-      <p:sp>
-        <p:nvSpPr>
-          <p:cNvPr id="15" name="矢印: 下 14">
-            <a:extLst>
-              <a:ext uri="{FF2B5EF4-FFF2-40B4-BE49-F238E27FC236}">
-                <a16:creationId xmlns:a16="http://schemas.microsoft.com/office/drawing/2014/main" id="{BE5BCB61-5451-441D-AEA2-8339CF8B64C5}"/>
-              </a:ext>
-            </a:extLst>
-          </p:cNvPr>
-          <p:cNvSpPr/>
-          <p:nvPr/>
-        </p:nvSpPr>
-        <p:spPr>
-          <a:xfrm rot="3978882">
-            <a:off x="3840010" y="2264790"/>
-            <a:ext cx="242721" cy="913375"/>
-          </a:xfrm>
-          <a:prstGeom prst="downArrow">
-            <a:avLst/>
-          </a:prstGeom>
-        </p:spPr>
-        <p:style>
-          <a:lnRef idx="2">
-            <a:schemeClr val="accent1">
-              <a:shade val="50000"/>
-            </a:schemeClr>
-          </a:lnRef>
-          <a:fillRef idx="1">
-            <a:schemeClr val="accent1"/>
-          </a:fillRef>
-          <a:effectRef idx="0">
-            <a:schemeClr val="accent1"/>
-          </a:effectRef>
-          <a:fontRef idx="minor">
-            <a:schemeClr val="lt1"/>
-          </a:fontRef>
-        </p:style>
-        <p:txBody>
-          <a:bodyPr rtlCol="0" anchor="ctr"/>
-          <a:lstStyle/>
-          <a:p>
-            <a:pPr algn="ctr"/>
-            <a:endParaRPr kumimoji="1" lang="ja-JP" altLang="en-US" dirty="0"/>
-          </a:p>
-        </p:txBody>
-      </p:sp>
-      <p:sp>
-        <p:nvSpPr>
-          <p:cNvPr id="16" name="矢印: 下 15">
-            <a:extLst>
-              <a:ext uri="{FF2B5EF4-FFF2-40B4-BE49-F238E27FC236}">
-                <a16:creationId xmlns:a16="http://schemas.microsoft.com/office/drawing/2014/main" id="{CB9EA1FD-D845-4C7C-9531-28C117590949}"/>
-              </a:ext>
-            </a:extLst>
-          </p:cNvPr>
-          <p:cNvSpPr/>
-          <p:nvPr/>
-        </p:nvSpPr>
-        <p:spPr>
-          <a:xfrm rot="5400000">
-            <a:off x="4853531" y="1310921"/>
-            <a:ext cx="255030" cy="588676"/>
-          </a:xfrm>
-          <a:prstGeom prst="downArrow">
-            <a:avLst/>
-          </a:prstGeom>
-        </p:spPr>
-        <p:style>
-          <a:lnRef idx="2">
-            <a:schemeClr val="accent1">
-              <a:shade val="50000"/>
-            </a:schemeClr>
-          </a:lnRef>
-          <a:fillRef idx="1">
-            <a:schemeClr val="accent1"/>
-          </a:fillRef>
-          <a:effectRef idx="0">
-            <a:schemeClr val="accent1"/>
-          </a:effectRef>
-          <a:fontRef idx="minor">
-            <a:schemeClr val="lt1"/>
-          </a:fontRef>
-        </p:style>
-        <p:txBody>
-          <a:bodyPr rtlCol="0" anchor="ctr"/>
-          <a:lstStyle/>
-          <a:p>
-            <a:pPr algn="ctr"/>
-            <a:endParaRPr kumimoji="1" lang="ja-JP" altLang="en-US"/>
-          </a:p>
-        </p:txBody>
-      </p:sp>
-      <p:sp>
-        <p:nvSpPr>
-          <p:cNvPr id="17" name="テキスト ボックス 16">
-            <a:extLst>
-              <a:ext uri="{FF2B5EF4-FFF2-40B4-BE49-F238E27FC236}">
-                <a16:creationId xmlns:a16="http://schemas.microsoft.com/office/drawing/2014/main" id="{1816BA9B-8C82-46A8-8F27-87AD37233AAD}"/>
-              </a:ext>
-            </a:extLst>
-          </p:cNvPr>
-          <p:cNvSpPr txBox="1"/>
-          <p:nvPr/>
-        </p:nvSpPr>
-        <p:spPr>
-          <a:xfrm>
-            <a:off x="189471" y="3331016"/>
-            <a:ext cx="6875584" cy="1200329"/>
-          </a:xfrm>
-          <a:prstGeom prst="rect">
-            <a:avLst/>
-          </a:prstGeom>
-          <a:noFill/>
-        </p:spPr>
-        <p:txBody>
-          <a:bodyPr wrap="square" rtlCol="0">
-            <a:spAutoFit/>
-          </a:bodyPr>
-          <a:lstStyle/>
-          <a:p>
-            <a:r>
-              <a:rPr lang="ja-JP" altLang="en-US" dirty="0"/>
-              <a:t>支持率の上下により各月の係数を決定</a:t>
-            </a:r>
-            <a:endParaRPr lang="en-US" altLang="ja-JP" dirty="0"/>
-          </a:p>
-          <a:p>
-            <a:r>
-              <a:rPr lang="ja-JP" altLang="en-US" dirty="0"/>
-              <a:t>遅行係数</a:t>
-            </a:r>
-            <a:r>
-              <a:rPr lang="en-US" altLang="ja-JP" dirty="0"/>
-              <a:t>…</a:t>
-            </a:r>
-            <a:r>
-              <a:rPr lang="ja-JP" altLang="en-US" dirty="0"/>
-              <a:t>支持率が上下した値を翌月の発言につける</a:t>
-            </a:r>
-            <a:endParaRPr lang="en-US" altLang="ja-JP" dirty="0"/>
-          </a:p>
-          <a:p>
-            <a:r>
-              <a:rPr lang="ja-JP" altLang="en-US" dirty="0"/>
-              <a:t>現在係数</a:t>
-            </a:r>
-            <a:r>
-              <a:rPr lang="en-US" altLang="ja-JP" dirty="0"/>
-              <a:t>…</a:t>
-            </a:r>
-            <a:r>
-              <a:rPr lang="ja-JP" altLang="en-US" dirty="0"/>
-              <a:t>上下した値を当月の発言につける</a:t>
-            </a:r>
-            <a:endParaRPr lang="en-US" altLang="ja-JP" dirty="0"/>
-          </a:p>
-          <a:p>
-            <a:r>
-              <a:rPr lang="ja-JP" altLang="en-US" dirty="0"/>
-              <a:t>先行係数</a:t>
-            </a:r>
-            <a:r>
-              <a:rPr lang="en-US" altLang="ja-JP" dirty="0"/>
-              <a:t>…</a:t>
-            </a:r>
-            <a:r>
-              <a:rPr lang="ja-JP" altLang="en-US" dirty="0"/>
-              <a:t>上下した値を前月の発言につける</a:t>
-            </a:r>
-            <a:endParaRPr lang="en-US" altLang="ja-JP" dirty="0"/>
-          </a:p>
-        </p:txBody>
-      </p:sp>
-      <p:pic>
-        <p:nvPicPr>
-          <p:cNvPr id="18" name="図 17">
-            <a:extLst>
-              <a:ext uri="{FF2B5EF4-FFF2-40B4-BE49-F238E27FC236}">
-                <a16:creationId xmlns:a16="http://schemas.microsoft.com/office/drawing/2014/main" id="{A15172F7-1296-4C5A-91DB-6517D03C7170}"/>
-              </a:ext>
-            </a:extLst>
-          </p:cNvPr>
-          <p:cNvPicPr>
-            <a:picLocks noChangeAspect="1"/>
-          </p:cNvPicPr>
-          <p:nvPr/>
-        </p:nvPicPr>
-        <p:blipFill>
-          <a:blip r:embed="rId3"/>
-          <a:stretch>
-            <a:fillRect/>
-          </a:stretch>
-        </p:blipFill>
-        <p:spPr>
-          <a:xfrm>
-            <a:off x="5599755" y="3730412"/>
-            <a:ext cx="3354774" cy="2453307"/>
-          </a:xfrm>
-          <a:prstGeom prst="rect">
-            <a:avLst/>
-          </a:prstGeom>
-        </p:spPr>
-      </p:pic>
-      <p:sp>
-        <p:nvSpPr>
-          <p:cNvPr id="19" name="矢印: 下 18">
-            <a:extLst>
-              <a:ext uri="{FF2B5EF4-FFF2-40B4-BE49-F238E27FC236}">
-                <a16:creationId xmlns:a16="http://schemas.microsoft.com/office/drawing/2014/main" id="{89E1A9A0-4ABD-449B-9BA7-97ED3B268292}"/>
-              </a:ext>
-            </a:extLst>
-          </p:cNvPr>
-          <p:cNvSpPr/>
-          <p:nvPr/>
-        </p:nvSpPr>
-        <p:spPr>
-          <a:xfrm>
-            <a:off x="1916723" y="4531345"/>
-            <a:ext cx="527539" cy="401140"/>
-          </a:xfrm>
-          <a:prstGeom prst="downArrow">
-            <a:avLst/>
-          </a:prstGeom>
-        </p:spPr>
-        <p:style>
-          <a:lnRef idx="2">
-            <a:schemeClr val="accent1">
-              <a:shade val="50000"/>
-            </a:schemeClr>
-          </a:lnRef>
-          <a:fillRef idx="1">
-            <a:schemeClr val="accent1"/>
-          </a:fillRef>
-          <a:effectRef idx="0">
-            <a:schemeClr val="accent1"/>
-          </a:effectRef>
-          <a:fontRef idx="minor">
-            <a:schemeClr val="lt1"/>
-          </a:fontRef>
-        </p:style>
-        <p:txBody>
-          <a:bodyPr rtlCol="0" anchor="ctr"/>
-          <a:lstStyle/>
-          <a:p>
-            <a:pPr algn="ctr"/>
-            <a:endParaRPr kumimoji="1" lang="ja-JP" altLang="en-US"/>
-          </a:p>
-        </p:txBody>
-      </p:sp>
-      <p:sp>
-        <p:nvSpPr>
-          <p:cNvPr id="20" name="テキスト ボックス 19">
-            <a:extLst>
-              <a:ext uri="{FF2B5EF4-FFF2-40B4-BE49-F238E27FC236}">
-                <a16:creationId xmlns:a16="http://schemas.microsoft.com/office/drawing/2014/main" id="{31B5C119-102B-4F25-9A78-98F745CCC3E5}"/>
-              </a:ext>
-            </a:extLst>
-          </p:cNvPr>
-          <p:cNvSpPr txBox="1"/>
-          <p:nvPr/>
-        </p:nvSpPr>
-        <p:spPr>
-          <a:xfrm>
-            <a:off x="430823" y="5187462"/>
-            <a:ext cx="4589585" cy="646331"/>
-          </a:xfrm>
-          <a:prstGeom prst="rect">
-            <a:avLst/>
-          </a:prstGeom>
-          <a:noFill/>
-        </p:spPr>
-        <p:txBody>
-          <a:bodyPr wrap="square" rtlCol="0">
-            <a:spAutoFit/>
-          </a:bodyPr>
-          <a:lstStyle/>
-          <a:p>
-            <a:r>
-              <a:rPr lang="ja-JP" altLang="en-US" dirty="0"/>
-              <a:t>各係数が上昇・降下した月のデータを値が</a:t>
-            </a:r>
-            <a:endParaRPr lang="en-US" altLang="ja-JP" dirty="0"/>
-          </a:p>
-          <a:p>
-            <a:r>
-              <a:rPr lang="ja-JP" altLang="en-US" dirty="0"/>
-              <a:t>大きい順に</a:t>
-            </a:r>
-            <a:r>
-              <a:rPr lang="en-US" altLang="ja-JP" dirty="0"/>
-              <a:t>10</a:t>
-            </a:r>
-            <a:r>
-              <a:rPr lang="ja-JP" altLang="en-US" dirty="0"/>
-              <a:t>個をデータセットとした</a:t>
-            </a:r>
-            <a:endParaRPr kumimoji="1" lang="ja-JP" altLang="en-US" dirty="0"/>
-          </a:p>
-        </p:txBody>
-      </p:sp>
-    </p:spTree>
-    <p:extLst>
-      <p:ext uri="{BB962C8B-B14F-4D97-AF65-F5344CB8AC3E}">
-        <p14:creationId xmlns:p14="http://schemas.microsoft.com/office/powerpoint/2010/main" val="3973278057"/>
-      </p:ext>
-    </p:extLst>
-  </p:cSld>
-  <p:clrMapOvr>
-    <a:masterClrMapping/>
-  </p:clrMapOvr>
-</p:sld>
-</file>
-
-<file path=ppt/slides/slide11.xml><?xml version="1.0" encoding="utf-8"?>
-<p:sld xmlns:a="http://schemas.openxmlformats.org/drawingml/2006/main" xmlns:r="http://schemas.openxmlformats.org/officeDocument/2006/relationships" xmlns:p="http://schemas.openxmlformats.org/presentationml/2006/main">
-  <p:cSld>
-    <p:spTree>
-      <p:nvGrpSpPr>
-        <p:cNvPr id="1" name=""/>
-        <p:cNvGrpSpPr/>
-        <p:nvPr/>
-      </p:nvGrpSpPr>
-      <p:grpSpPr>
-        <a:xfrm>
-          <a:off x="0" y="0"/>
-          <a:ext cx="0" cy="0"/>
-          <a:chOff x="0" y="0"/>
-          <a:chExt cx="0" cy="0"/>
-        </a:xfrm>
-      </p:grpSpPr>
-      <p:sp>
-        <p:nvSpPr>
           <p:cNvPr id="2" name="タイトル 1">
             <a:extLst>
               <a:ext uri="{FF2B5EF4-FFF2-40B4-BE49-F238E27FC236}">
@@ -9403,7 +8966,7 @@
 </p:sld>
 </file>
 
-<file path=ppt/slides/slide12.xml><?xml version="1.0" encoding="utf-8"?>
+<file path=ppt/slides/slide11.xml><?xml version="1.0" encoding="utf-8"?>
 <p:sld xmlns:a="http://schemas.openxmlformats.org/drawingml/2006/main" xmlns:r="http://schemas.openxmlformats.org/officeDocument/2006/relationships" xmlns:p="http://schemas.openxmlformats.org/presentationml/2006/main">
   <p:cSld>
     <p:spTree>
@@ -9488,7 +9051,7 @@
 </p:sld>
 </file>
 
-<file path=ppt/slides/slide13.xml><?xml version="1.0" encoding="utf-8"?>
+<file path=ppt/slides/slide12.xml><?xml version="1.0" encoding="utf-8"?>
 <p:sld xmlns:a="http://schemas.openxmlformats.org/drawingml/2006/main" xmlns:r="http://schemas.openxmlformats.org/officeDocument/2006/relationships" xmlns:p="http://schemas.openxmlformats.org/presentationml/2006/main">
   <p:cSld>
     <p:spTree>
@@ -9727,6 +9290,93 @@
     <p:extLst>
       <p:ext uri="{BB962C8B-B14F-4D97-AF65-F5344CB8AC3E}">
         <p14:creationId xmlns:p14="http://schemas.microsoft.com/office/powerpoint/2010/main" val="2856975801"/>
+      </p:ext>
+    </p:extLst>
+  </p:cSld>
+  <p:clrMapOvr>
+    <a:masterClrMapping/>
+  </p:clrMapOvr>
+</p:sld>
+</file>
+
+<file path=ppt/slides/slide13.xml><?xml version="1.0" encoding="utf-8"?>
+<p:sld xmlns:a="http://schemas.openxmlformats.org/drawingml/2006/main" xmlns:r="http://schemas.openxmlformats.org/officeDocument/2006/relationships" xmlns:p="http://schemas.openxmlformats.org/presentationml/2006/main">
+  <p:cSld>
+    <p:spTree>
+      <p:nvGrpSpPr>
+        <p:cNvPr id="1" name=""/>
+        <p:cNvGrpSpPr/>
+        <p:nvPr/>
+      </p:nvGrpSpPr>
+      <p:grpSpPr>
+        <a:xfrm>
+          <a:off x="0" y="0"/>
+          <a:ext cx="0" cy="0"/>
+          <a:chOff x="0" y="0"/>
+          <a:chExt cx="0" cy="0"/>
+        </a:xfrm>
+      </p:grpSpPr>
+      <p:sp>
+        <p:nvSpPr>
+          <p:cNvPr id="2" name="タイトル 1">
+            <a:extLst>
+              <a:ext uri="{FF2B5EF4-FFF2-40B4-BE49-F238E27FC236}">
+                <a16:creationId xmlns:a16="http://schemas.microsoft.com/office/drawing/2014/main" id="{68B75419-C70E-4E5B-BD78-E3D3903C5A41}"/>
+              </a:ext>
+            </a:extLst>
+          </p:cNvPr>
+          <p:cNvSpPr>
+            <a:spLocks noGrp="1"/>
+          </p:cNvSpPr>
+          <p:nvPr>
+            <p:ph type="title"/>
+          </p:nvPr>
+        </p:nvSpPr>
+        <p:spPr/>
+        <p:txBody>
+          <a:bodyPr/>
+          <a:lstStyle/>
+          <a:p>
+            <a:r>
+              <a:rPr kumimoji="1" lang="en-US" altLang="ja-JP" dirty="0" err="1"/>
+              <a:t>Tf-IDF</a:t>
+            </a:r>
+            <a:r>
+              <a:rPr kumimoji="1" lang="ja-JP" altLang="en-US" dirty="0"/>
+              <a:t>の説明</a:t>
+            </a:r>
+          </a:p>
+        </p:txBody>
+      </p:sp>
+      <p:sp>
+        <p:nvSpPr>
+          <p:cNvPr id="3" name="コンテンツ プレースホルダー 2">
+            <a:extLst>
+              <a:ext uri="{FF2B5EF4-FFF2-40B4-BE49-F238E27FC236}">
+                <a16:creationId xmlns:a16="http://schemas.microsoft.com/office/drawing/2014/main" id="{576ECDEB-E7AF-438E-A561-A9003A527FE7}"/>
+              </a:ext>
+            </a:extLst>
+          </p:cNvPr>
+          <p:cNvSpPr>
+            <a:spLocks noGrp="1"/>
+          </p:cNvSpPr>
+          <p:nvPr>
+            <p:ph idx="1"/>
+          </p:nvPr>
+        </p:nvSpPr>
+        <p:spPr/>
+        <p:txBody>
+          <a:bodyPr/>
+          <a:lstStyle/>
+          <a:p>
+            <a:endParaRPr kumimoji="1" lang="ja-JP" altLang="en-US"/>
+          </a:p>
+        </p:txBody>
+      </p:sp>
+    </p:spTree>
+    <p:extLst>
+      <p:ext uri="{BB962C8B-B14F-4D97-AF65-F5344CB8AC3E}">
+        <p14:creationId xmlns:p14="http://schemas.microsoft.com/office/powerpoint/2010/main" val="1080144413"/>
       </p:ext>
     </p:extLst>
   </p:cSld>
@@ -10007,6 +9657,178 @@
           <p:cNvPr id="2" name="タイトル 1">
             <a:extLst>
               <a:ext uri="{FF2B5EF4-FFF2-40B4-BE49-F238E27FC236}">
+                <a16:creationId xmlns:a16="http://schemas.microsoft.com/office/drawing/2014/main" id="{1BA205BB-933A-43A9-925E-FFDB69C9A609}"/>
+              </a:ext>
+            </a:extLst>
+          </p:cNvPr>
+          <p:cNvSpPr>
+            <a:spLocks noGrp="1"/>
+          </p:cNvSpPr>
+          <p:nvPr>
+            <p:ph type="title"/>
+          </p:nvPr>
+        </p:nvSpPr>
+        <p:spPr/>
+        <p:txBody>
+          <a:bodyPr>
+            <a:normAutofit/>
+          </a:bodyPr>
+          <a:lstStyle/>
+          <a:p>
+            <a:r>
+              <a:rPr kumimoji="1" lang="ja-JP" altLang="en-US" dirty="0"/>
+              <a:t>考察</a:t>
+            </a:r>
+          </a:p>
+        </p:txBody>
+      </p:sp>
+      <p:sp>
+        <p:nvSpPr>
+          <p:cNvPr id="3" name="コンテンツ プレースホルダー 2">
+            <a:extLst>
+              <a:ext uri="{FF2B5EF4-FFF2-40B4-BE49-F238E27FC236}">
+                <a16:creationId xmlns:a16="http://schemas.microsoft.com/office/drawing/2014/main" id="{44145606-7964-4AFC-B5B5-4915F39BAF99}"/>
+              </a:ext>
+            </a:extLst>
+          </p:cNvPr>
+          <p:cNvSpPr>
+            <a:spLocks noGrp="1"/>
+          </p:cNvSpPr>
+          <p:nvPr>
+            <p:ph idx="1"/>
+          </p:nvPr>
+        </p:nvSpPr>
+        <p:spPr/>
+        <p:txBody>
+          <a:bodyPr/>
+          <a:lstStyle/>
+          <a:p>
+            <a:pPr>
+              <a:buFont typeface="Wingdings" panose="05000000000000000000" pitchFamily="2" charset="2"/>
+              <a:buChar char="l"/>
+            </a:pPr>
+            <a:r>
+              <a:rPr kumimoji="1" lang="ja-JP" altLang="en-US" dirty="0"/>
+              <a:t>同じ人の発言のため、特徴が出にくい。</a:t>
+            </a:r>
+            <a:endParaRPr kumimoji="1" lang="en-US" altLang="ja-JP" dirty="0"/>
+          </a:p>
+          <a:p>
+            <a:pPr marL="0" indent="0">
+              <a:buNone/>
+            </a:pPr>
+            <a:r>
+              <a:rPr lang="ja-JP" altLang="en-US" dirty="0"/>
+              <a:t>➝したがって、機械学習における判別が難しい</a:t>
+            </a:r>
+            <a:endParaRPr lang="en-US" altLang="ja-JP" dirty="0"/>
+          </a:p>
+          <a:p>
+            <a:pPr marL="0" indent="0">
+              <a:buNone/>
+            </a:pPr>
+            <a:endParaRPr lang="en-US" altLang="ja-JP" dirty="0"/>
+          </a:p>
+          <a:p>
+            <a:pPr>
+              <a:buFont typeface="Wingdings" panose="05000000000000000000" pitchFamily="2" charset="2"/>
+              <a:buChar char="l"/>
+            </a:pPr>
+            <a:r>
+              <a:rPr lang="en-US" altLang="ja-JP" dirty="0"/>
+              <a:t>Bag of Words</a:t>
+            </a:r>
+            <a:r>
+              <a:rPr lang="ja-JP" altLang="en-US" dirty="0"/>
+              <a:t>の次元が大きすぎるため過学習してしまう。</a:t>
+            </a:r>
+            <a:endParaRPr lang="en-US" altLang="ja-JP" dirty="0"/>
+          </a:p>
+          <a:p>
+            <a:pPr marL="0" indent="0">
+              <a:buNone/>
+            </a:pPr>
+            <a:r>
+              <a:rPr lang="ja-JP" altLang="en-US" dirty="0"/>
+              <a:t>➝</a:t>
+            </a:r>
+            <a:r>
+              <a:rPr lang="en-US" altLang="ja-JP" dirty="0"/>
+              <a:t>LSI</a:t>
+            </a:r>
+            <a:r>
+              <a:rPr lang="ja-JP" altLang="en-US" dirty="0"/>
+              <a:t>等による次元削減を試みる。</a:t>
+            </a:r>
+            <a:endParaRPr lang="en-US" altLang="ja-JP" dirty="0"/>
+          </a:p>
+          <a:p>
+            <a:pPr marL="0" indent="0">
+              <a:buNone/>
+            </a:pPr>
+            <a:r>
+              <a:rPr lang="ja-JP" altLang="en-US" dirty="0"/>
+              <a:t>➝出現頻度が高すぎる</a:t>
+            </a:r>
+            <a:r>
+              <a:rPr lang="en-US" altLang="ja-JP" dirty="0"/>
+              <a:t>/</a:t>
+            </a:r>
+            <a:r>
+              <a:rPr lang="ja-JP" altLang="en-US" dirty="0"/>
+              <a:t>低すぎる単語をあらかじめ取り除く。</a:t>
+            </a:r>
+            <a:endParaRPr lang="en-US" altLang="ja-JP" dirty="0"/>
+          </a:p>
+          <a:p>
+            <a:pPr marL="0" indent="0">
+              <a:buNone/>
+            </a:pPr>
+            <a:endParaRPr kumimoji="1" lang="en-US" altLang="ja-JP" dirty="0"/>
+          </a:p>
+          <a:p>
+            <a:pPr marL="0" indent="0">
+              <a:buNone/>
+            </a:pPr>
+            <a:endParaRPr kumimoji="1" lang="ja-JP" altLang="en-US" dirty="0"/>
+          </a:p>
+        </p:txBody>
+      </p:sp>
+    </p:spTree>
+    <p:extLst>
+      <p:ext uri="{BB962C8B-B14F-4D97-AF65-F5344CB8AC3E}">
+        <p14:creationId xmlns:p14="http://schemas.microsoft.com/office/powerpoint/2010/main" val="735828826"/>
+      </p:ext>
+    </p:extLst>
+  </p:cSld>
+  <p:clrMapOvr>
+    <a:masterClrMapping/>
+  </p:clrMapOvr>
+</p:sld>
+</file>
+
+<file path=ppt/slides/slide16.xml><?xml version="1.0" encoding="utf-8"?>
+<p:sld xmlns:a="http://schemas.openxmlformats.org/drawingml/2006/main" xmlns:r="http://schemas.openxmlformats.org/officeDocument/2006/relationships" xmlns:p="http://schemas.openxmlformats.org/presentationml/2006/main">
+  <p:cSld>
+    <p:spTree>
+      <p:nvGrpSpPr>
+        <p:cNvPr id="1" name=""/>
+        <p:cNvGrpSpPr/>
+        <p:nvPr/>
+      </p:nvGrpSpPr>
+      <p:grpSpPr>
+        <a:xfrm>
+          <a:off x="0" y="0"/>
+          <a:ext cx="0" cy="0"/>
+          <a:chOff x="0" y="0"/>
+          <a:chExt cx="0" cy="0"/>
+        </a:xfrm>
+      </p:grpSpPr>
+      <p:sp>
+        <p:nvSpPr>
+          <p:cNvPr id="2" name="タイトル 1">
+            <a:extLst>
+              <a:ext uri="{FF2B5EF4-FFF2-40B4-BE49-F238E27FC236}">
                 <a16:creationId xmlns:a16="http://schemas.microsoft.com/office/drawing/2014/main" id="{79A06B2C-5FE1-4D7B-876D-B72DE8B53AF0}"/>
               </a:ext>
             </a:extLst>
@@ -10078,12 +9900,6 @@
               </a:rPr>
               <a:t>secure-forest-47133.herokuapp.com</a:t>
             </a:r>
-            <a:endParaRPr lang="en-US" altLang="ja-JP" dirty="0"/>
-          </a:p>
-          <a:p>
-            <a:pPr marL="0" indent="0">
-              <a:buNone/>
-            </a:pPr>
             <a:endParaRPr lang="en-US" altLang="ja-JP" dirty="0"/>
           </a:p>
           <a:p>
@@ -10223,8 +10039,8 @@
         </p:blipFill>
         <p:spPr>
           <a:xfrm>
-            <a:off x="5150502" y="1488075"/>
-            <a:ext cx="3771901" cy="2443164"/>
+            <a:off x="5546156" y="1484375"/>
+            <a:ext cx="3376247" cy="2186888"/>
           </a:xfrm>
           <a:prstGeom prst="rect">
             <a:avLst/>
@@ -10309,7 +10125,7 @@
         </p:nvSpPr>
         <p:spPr>
           <a:xfrm>
-            <a:off x="137160" y="76622"/>
+            <a:off x="93199" y="0"/>
             <a:ext cx="7543800" cy="960305"/>
           </a:xfrm>
         </p:spPr>
@@ -10352,43 +10168,100 @@
               <a:buChar char="l"/>
             </a:pPr>
             <a:r>
-              <a:rPr kumimoji="1" lang="ja-JP" altLang="en-US" sz="3600" dirty="0"/>
-              <a:t>前回の内容</a:t>
-            </a:r>
-            <a:endParaRPr kumimoji="1" lang="en-US" altLang="ja-JP" sz="3600" dirty="0"/>
-          </a:p>
-          <a:p>
-            <a:pPr marL="749808" lvl="1" indent="-457200">
+              <a:rPr lang="ja-JP" altLang="en-US" sz="3600" dirty="0">
+                <a:solidFill>
+                  <a:schemeClr val="tx1"/>
+                </a:solidFill>
+              </a:rPr>
+              <a:t>今回の内容</a:t>
+            </a:r>
+            <a:endParaRPr lang="en-US" altLang="ja-JP" sz="3600" dirty="0">
+              <a:solidFill>
+                <a:schemeClr val="tx1"/>
+              </a:solidFill>
+            </a:endParaRPr>
+          </a:p>
+          <a:p>
+            <a:pPr lvl="1">
               <a:buFont typeface="Wingdings" panose="05000000000000000000" pitchFamily="2" charset="2"/>
               <a:buChar char="u"/>
             </a:pPr>
             <a:r>
-              <a:rPr lang="ja-JP" altLang="en-US" sz="2800" dirty="0"/>
-              <a:t>前回の内容</a:t>
-            </a:r>
-            <a:endParaRPr lang="en-US" altLang="ja-JP" sz="2800" dirty="0"/>
-          </a:p>
-          <a:p>
-            <a:pPr marL="749808" lvl="1" indent="-457200">
+              <a:rPr lang="ja-JP" altLang="en-US" sz="2800" dirty="0">
+                <a:solidFill>
+                  <a:schemeClr val="tx1"/>
+                </a:solidFill>
+              </a:rPr>
+              <a:t>テーマ全体の説明</a:t>
+            </a:r>
+            <a:endParaRPr lang="en-US" altLang="ja-JP" sz="2800" dirty="0">
+              <a:solidFill>
+                <a:schemeClr val="tx1"/>
+              </a:solidFill>
+            </a:endParaRPr>
+          </a:p>
+          <a:p>
+            <a:pPr lvl="1">
               <a:buFont typeface="Wingdings" panose="05000000000000000000" pitchFamily="2" charset="2"/>
               <a:buChar char="u"/>
             </a:pPr>
             <a:r>
-              <a:rPr lang="ja-JP" altLang="en-US" sz="2800" dirty="0"/>
-              <a:t>前回の反省点</a:t>
-            </a:r>
-            <a:endParaRPr lang="en-US" altLang="ja-JP" sz="2800" dirty="0"/>
-          </a:p>
-          <a:p>
-            <a:pPr marL="749808" lvl="1" indent="-457200">
+              <a:rPr lang="ja-JP" altLang="en-US" sz="2800" dirty="0">
+                <a:solidFill>
+                  <a:schemeClr val="tx1"/>
+                </a:solidFill>
+              </a:rPr>
+              <a:t>今回の進捗説明</a:t>
+            </a:r>
+            <a:endParaRPr lang="en-US" altLang="ja-JP" sz="2800" dirty="0">
+              <a:solidFill>
+                <a:schemeClr val="tx1"/>
+              </a:solidFill>
+            </a:endParaRPr>
+          </a:p>
+          <a:p>
+            <a:pPr lvl="1">
               <a:buFont typeface="Wingdings" panose="05000000000000000000" pitchFamily="2" charset="2"/>
               <a:buChar char="u"/>
             </a:pPr>
             <a:r>
-              <a:rPr lang="ja-JP" altLang="en-US" sz="2800" dirty="0"/>
-              <a:t>修正点</a:t>
-            </a:r>
-            <a:endParaRPr kumimoji="1" lang="en-US" altLang="ja-JP" sz="3600" dirty="0"/>
+              <a:rPr lang="ja-JP" altLang="en-US" sz="2800" dirty="0">
+                <a:solidFill>
+                  <a:schemeClr val="tx1"/>
+                </a:solidFill>
+              </a:rPr>
+              <a:t>結果</a:t>
+            </a:r>
+            <a:endParaRPr lang="en-US" altLang="ja-JP" sz="2800" dirty="0">
+              <a:solidFill>
+                <a:schemeClr val="tx1"/>
+              </a:solidFill>
+            </a:endParaRPr>
+          </a:p>
+          <a:p>
+            <a:pPr lvl="1">
+              <a:buFont typeface="Wingdings" panose="05000000000000000000" pitchFamily="2" charset="2"/>
+              <a:buChar char="u"/>
+            </a:pPr>
+            <a:r>
+              <a:rPr lang="ja-JP" altLang="en-US" sz="2800" dirty="0">
+                <a:solidFill>
+                  <a:schemeClr val="tx1"/>
+                </a:solidFill>
+              </a:rPr>
+              <a:t>考察</a:t>
+            </a:r>
+          </a:p>
+          <a:p>
+            <a:pPr lvl="1">
+              <a:buFont typeface="Wingdings" panose="05000000000000000000" pitchFamily="2" charset="2"/>
+              <a:buChar char="l"/>
+            </a:pPr>
+            <a:endParaRPr lang="en-US" altLang="ja-JP" sz="2800" dirty="0">
+              <a:solidFill>
+                <a:schemeClr val="tx1"/>
+              </a:solidFill>
+            </a:endParaRPr>
           </a:p>
           <a:p>
             <a:pPr>
@@ -10399,30 +10272,7 @@
               <a:rPr lang="ja-JP" altLang="en-US" sz="3600" dirty="0">
                 <a:solidFill>
                   <a:schemeClr val="bg1">
-                    <a:lumMod val="65000"/>
-                  </a:schemeClr>
-                </a:solidFill>
-              </a:rPr>
-              <a:t>今回の内容</a:t>
-            </a:r>
-            <a:endParaRPr lang="en-US" altLang="ja-JP" sz="3600" dirty="0">
-              <a:solidFill>
-                <a:schemeClr val="bg1">
-                  <a:lumMod val="65000"/>
-                </a:schemeClr>
-              </a:solidFill>
-            </a:endParaRPr>
-          </a:p>
-          <a:p>
-            <a:pPr>
-              <a:buFont typeface="Wingdings" panose="05000000000000000000" pitchFamily="2" charset="2"/>
-              <a:buChar char="l"/>
-            </a:pPr>
-            <a:r>
-              <a:rPr lang="ja-JP" altLang="en-US" sz="3600" dirty="0">
-                <a:solidFill>
-                  <a:schemeClr val="bg1">
-                    <a:lumMod val="65000"/>
+                    <a:lumMod val="75000"/>
                   </a:schemeClr>
                 </a:solidFill>
               </a:rPr>
@@ -10431,7 +10281,7 @@
             <a:endParaRPr lang="en-US" altLang="ja-JP" sz="3600" dirty="0">
               <a:solidFill>
                 <a:schemeClr val="bg1">
-                  <a:lumMod val="65000"/>
+                  <a:lumMod val="75000"/>
                 </a:schemeClr>
               </a:solidFill>
             </a:endParaRPr>
@@ -10441,7 +10291,7 @@
     </p:spTree>
     <p:extLst>
       <p:ext uri="{BB962C8B-B14F-4D97-AF65-F5344CB8AC3E}">
-        <p14:creationId xmlns:p14="http://schemas.microsoft.com/office/powerpoint/2010/main" val="1219321487"/>
+        <p14:creationId xmlns:p14="http://schemas.microsoft.com/office/powerpoint/2010/main" val="3974556905"/>
       </p:ext>
     </p:extLst>
   </p:cSld>
@@ -10473,240 +10323,6 @@
           <p:cNvPr id="2" name="タイトル 1">
             <a:extLst>
               <a:ext uri="{FF2B5EF4-FFF2-40B4-BE49-F238E27FC236}">
-                <a16:creationId xmlns:a16="http://schemas.microsoft.com/office/drawing/2014/main" id="{63BC6915-39F5-4843-801C-749D0C08440B}"/>
-              </a:ext>
-            </a:extLst>
-          </p:cNvPr>
-          <p:cNvSpPr>
-            <a:spLocks noGrp="1"/>
-          </p:cNvSpPr>
-          <p:nvPr>
-            <p:ph type="title"/>
-          </p:nvPr>
-        </p:nvSpPr>
-        <p:spPr>
-          <a:xfrm>
-            <a:off x="93199" y="0"/>
-            <a:ext cx="7543800" cy="960305"/>
-          </a:xfrm>
-        </p:spPr>
-        <p:txBody>
-          <a:bodyPr/>
-          <a:lstStyle/>
-          <a:p>
-            <a:r>
-              <a:rPr kumimoji="1" lang="ja-JP" altLang="en-US" dirty="0"/>
-              <a:t>目次</a:t>
-            </a:r>
-          </a:p>
-        </p:txBody>
-      </p:sp>
-      <p:sp>
-        <p:nvSpPr>
-          <p:cNvPr id="3" name="コンテンツ プレースホルダー 2">
-            <a:extLst>
-              <a:ext uri="{FF2B5EF4-FFF2-40B4-BE49-F238E27FC236}">
-                <a16:creationId xmlns:a16="http://schemas.microsoft.com/office/drawing/2014/main" id="{9F0B7029-CDCA-4407-BAA5-8C80742B6A0E}"/>
-              </a:ext>
-            </a:extLst>
-          </p:cNvPr>
-          <p:cNvSpPr>
-            <a:spLocks noGrp="1"/>
-          </p:cNvSpPr>
-          <p:nvPr>
-            <p:ph idx="1"/>
-          </p:nvPr>
-        </p:nvSpPr>
-        <p:spPr/>
-        <p:txBody>
-          <a:bodyPr>
-            <a:normAutofit/>
-          </a:bodyPr>
-          <a:lstStyle/>
-          <a:p>
-            <a:pPr>
-              <a:buFont typeface="Wingdings" panose="05000000000000000000" pitchFamily="2" charset="2"/>
-              <a:buChar char="l"/>
-            </a:pPr>
-            <a:r>
-              <a:rPr kumimoji="1" lang="ja-JP" altLang="en-US" sz="3600" dirty="0">
-                <a:solidFill>
-                  <a:schemeClr val="bg1">
-                    <a:lumMod val="75000"/>
-                  </a:schemeClr>
-                </a:solidFill>
-              </a:rPr>
-              <a:t>前回の内容</a:t>
-            </a:r>
-            <a:endParaRPr kumimoji="1" lang="en-US" altLang="ja-JP" sz="3600" dirty="0">
-              <a:solidFill>
-                <a:schemeClr val="bg1">
-                  <a:lumMod val="75000"/>
-                </a:schemeClr>
-              </a:solidFill>
-            </a:endParaRPr>
-          </a:p>
-          <a:p>
-            <a:pPr>
-              <a:buFont typeface="Wingdings" panose="05000000000000000000" pitchFamily="2" charset="2"/>
-              <a:buChar char="l"/>
-            </a:pPr>
-            <a:r>
-              <a:rPr lang="ja-JP" altLang="en-US" sz="3600" dirty="0">
-                <a:solidFill>
-                  <a:schemeClr val="tx1"/>
-                </a:solidFill>
-              </a:rPr>
-              <a:t>今回の内容</a:t>
-            </a:r>
-            <a:endParaRPr lang="en-US" altLang="ja-JP" sz="3600" dirty="0">
-              <a:solidFill>
-                <a:schemeClr val="tx1"/>
-              </a:solidFill>
-            </a:endParaRPr>
-          </a:p>
-          <a:p>
-            <a:pPr lvl="1">
-              <a:buFont typeface="Wingdings" panose="05000000000000000000" pitchFamily="2" charset="2"/>
-              <a:buChar char="u"/>
-            </a:pPr>
-            <a:r>
-              <a:rPr lang="ja-JP" altLang="en-US" sz="2800" dirty="0">
-                <a:solidFill>
-                  <a:schemeClr val="tx1"/>
-                </a:solidFill>
-              </a:rPr>
-              <a:t>テーマ全体の説明</a:t>
-            </a:r>
-            <a:endParaRPr lang="en-US" altLang="ja-JP" sz="2800" dirty="0">
-              <a:solidFill>
-                <a:schemeClr val="tx1"/>
-              </a:solidFill>
-            </a:endParaRPr>
-          </a:p>
-          <a:p>
-            <a:pPr lvl="1">
-              <a:buFont typeface="Wingdings" panose="05000000000000000000" pitchFamily="2" charset="2"/>
-              <a:buChar char="u"/>
-            </a:pPr>
-            <a:r>
-              <a:rPr lang="ja-JP" altLang="en-US" sz="2800" dirty="0">
-                <a:solidFill>
-                  <a:schemeClr val="tx1"/>
-                </a:solidFill>
-              </a:rPr>
-              <a:t>今回の進捗説明</a:t>
-            </a:r>
-            <a:endParaRPr lang="en-US" altLang="ja-JP" sz="2800" dirty="0">
-              <a:solidFill>
-                <a:schemeClr val="tx1"/>
-              </a:solidFill>
-            </a:endParaRPr>
-          </a:p>
-          <a:p>
-            <a:pPr lvl="1">
-              <a:buFont typeface="Wingdings" panose="05000000000000000000" pitchFamily="2" charset="2"/>
-              <a:buChar char="u"/>
-            </a:pPr>
-            <a:r>
-              <a:rPr lang="ja-JP" altLang="en-US" sz="2800" dirty="0">
-                <a:solidFill>
-                  <a:schemeClr val="tx1"/>
-                </a:solidFill>
-              </a:rPr>
-              <a:t>結果</a:t>
-            </a:r>
-            <a:endParaRPr lang="en-US" altLang="ja-JP" sz="2800" dirty="0">
-              <a:solidFill>
-                <a:schemeClr val="tx1"/>
-              </a:solidFill>
-            </a:endParaRPr>
-          </a:p>
-          <a:p>
-            <a:pPr lvl="1">
-              <a:buFont typeface="Wingdings" panose="05000000000000000000" pitchFamily="2" charset="2"/>
-              <a:buChar char="u"/>
-            </a:pPr>
-            <a:r>
-              <a:rPr lang="ja-JP" altLang="en-US" sz="2800" dirty="0">
-                <a:solidFill>
-                  <a:schemeClr val="tx1"/>
-                </a:solidFill>
-              </a:rPr>
-              <a:t>考察</a:t>
-            </a:r>
-          </a:p>
-          <a:p>
-            <a:pPr lvl="1">
-              <a:buFont typeface="Wingdings" panose="05000000000000000000" pitchFamily="2" charset="2"/>
-              <a:buChar char="l"/>
-            </a:pPr>
-            <a:endParaRPr lang="en-US" altLang="ja-JP" sz="2800" dirty="0">
-              <a:solidFill>
-                <a:schemeClr val="tx1"/>
-              </a:solidFill>
-            </a:endParaRPr>
-          </a:p>
-          <a:p>
-            <a:pPr>
-              <a:buFont typeface="Wingdings" panose="05000000000000000000" pitchFamily="2" charset="2"/>
-              <a:buChar char="l"/>
-            </a:pPr>
-            <a:r>
-              <a:rPr lang="ja-JP" altLang="en-US" sz="3600" dirty="0">
-                <a:solidFill>
-                  <a:schemeClr val="bg1">
-                    <a:lumMod val="75000"/>
-                  </a:schemeClr>
-                </a:solidFill>
-              </a:rPr>
-              <a:t>今後の予定</a:t>
-            </a:r>
-            <a:endParaRPr lang="en-US" altLang="ja-JP" sz="3600" dirty="0">
-              <a:solidFill>
-                <a:schemeClr val="bg1">
-                  <a:lumMod val="75000"/>
-                </a:schemeClr>
-              </a:solidFill>
-            </a:endParaRPr>
-          </a:p>
-        </p:txBody>
-      </p:sp>
-    </p:spTree>
-    <p:extLst>
-      <p:ext uri="{BB962C8B-B14F-4D97-AF65-F5344CB8AC3E}">
-        <p14:creationId xmlns:p14="http://schemas.microsoft.com/office/powerpoint/2010/main" val="3974556905"/>
-      </p:ext>
-    </p:extLst>
-  </p:cSld>
-  <p:clrMapOvr>
-    <a:masterClrMapping/>
-  </p:clrMapOvr>
-</p:sld>
-</file>
-
-<file path=ppt/slides/slide4.xml><?xml version="1.0" encoding="utf-8"?>
-<p:sld xmlns:a="http://schemas.openxmlformats.org/drawingml/2006/main" xmlns:r="http://schemas.openxmlformats.org/officeDocument/2006/relationships" xmlns:p="http://schemas.openxmlformats.org/presentationml/2006/main">
-  <p:cSld>
-    <p:spTree>
-      <p:nvGrpSpPr>
-        <p:cNvPr id="1" name=""/>
-        <p:cNvGrpSpPr/>
-        <p:nvPr/>
-      </p:nvGrpSpPr>
-      <p:grpSpPr>
-        <a:xfrm>
-          <a:off x="0" y="0"/>
-          <a:ext cx="0" cy="0"/>
-          <a:chOff x="0" y="0"/>
-          <a:chExt cx="0" cy="0"/>
-        </a:xfrm>
-      </p:grpSpPr>
-      <p:sp>
-        <p:nvSpPr>
-          <p:cNvPr id="2" name="タイトル 1">
-            <a:extLst>
-              <a:ext uri="{FF2B5EF4-FFF2-40B4-BE49-F238E27FC236}">
                 <a16:creationId xmlns:a16="http://schemas.microsoft.com/office/drawing/2014/main" id="{1F88E3FA-3451-4C02-9BB3-6A412543D6DC}"/>
               </a:ext>
             </a:extLst>
@@ -10773,32 +10389,14 @@
               <a:buNone/>
             </a:pPr>
             <a:r>
-              <a:rPr lang="ja-JP" altLang="en-US" sz="4000" dirty="0">
+              <a:rPr lang="ja-JP" altLang="en-US" sz="3200" dirty="0">
                 <a:solidFill>
                   <a:schemeClr val="tx1"/>
                 </a:solidFill>
               </a:rPr>
-              <a:t>「内閣支持率と答弁データの</a:t>
-            </a:r>
-            <a:endParaRPr lang="en-US" altLang="ja-JP" sz="4000" dirty="0">
-              <a:solidFill>
-                <a:schemeClr val="tx1"/>
-              </a:solidFill>
-            </a:endParaRPr>
-          </a:p>
-          <a:p>
-            <a:pPr marL="0" indent="0" algn="ctr">
-              <a:buNone/>
-            </a:pPr>
-            <a:r>
-              <a:rPr lang="ja-JP" altLang="en-US" sz="4000" dirty="0">
-                <a:solidFill>
-                  <a:schemeClr val="tx1"/>
-                </a:solidFill>
-              </a:rPr>
-              <a:t>　動的相関の研究」</a:t>
-            </a:r>
-            <a:endParaRPr lang="en-US" altLang="ja-JP" sz="4000" dirty="0">
+              <a:t>「内閣支持率と答弁データの動的相関の研究」</a:t>
+            </a:r>
+            <a:endParaRPr lang="en-US" altLang="ja-JP" sz="3200" dirty="0">
               <a:solidFill>
                 <a:schemeClr val="tx1"/>
               </a:solidFill>
@@ -10828,7 +10426,7 @@
 </p:sld>
 </file>
 
-<file path=ppt/slides/slide5.xml><?xml version="1.0" encoding="utf-8"?>
+<file path=ppt/slides/slide4.xml><?xml version="1.0" encoding="utf-8"?>
 <p:sld xmlns:a="http://schemas.openxmlformats.org/drawingml/2006/main" xmlns:r="http://schemas.openxmlformats.org/officeDocument/2006/relationships" xmlns:p="http://schemas.openxmlformats.org/presentationml/2006/main">
   <p:cSld>
     <p:spTree>
@@ -11090,23 +10688,6 @@
               <a:tabLst/>
               <a:defRPr/>
             </a:pPr>
-            <a:r>
-              <a:rPr kumimoji="1" lang="ja-JP" altLang="en-US" sz="2700" b="1" i="0" u="none" strike="noStrike" kern="1200" cap="none" spc="0" normalizeH="0" baseline="0" noProof="0" dirty="0">
-                <a:ln>
-                  <a:noFill/>
-                </a:ln>
-                <a:solidFill>
-                  <a:prstClr val="black"/>
-                </a:solidFill>
-                <a:effectLst/>
-                <a:uLnTx/>
-                <a:uFillTx/>
-                <a:latin typeface="Calibri" panose="020F0502020204030204"/>
-                <a:ea typeface="游ゴシック" panose="020B0400000000000000" pitchFamily="50" charset="-128"/>
-                <a:cs typeface="+mn-cs"/>
-              </a:rPr>
-              <a:t>「言語データの動的分析手法の確立」</a:t>
-            </a:r>
             <a:endParaRPr kumimoji="1" lang="en-US" altLang="ja-JP" sz="2700" b="1" i="0" u="none" strike="noStrike" kern="1200" cap="none" spc="0" normalizeH="0" baseline="0" noProof="0" dirty="0">
               <a:ln>
                 <a:noFill/>
@@ -11138,8 +10719,8 @@
         </p:nvSpPr>
         <p:spPr>
           <a:xfrm>
-            <a:off x="437598" y="999617"/>
-            <a:ext cx="8077753" cy="584775"/>
+            <a:off x="0" y="999617"/>
+            <a:ext cx="9141114" cy="584775"/>
           </a:xfrm>
           <a:prstGeom prst="rect">
             <a:avLst/>
@@ -11151,7 +10732,7 @@
           </a:bodyPr>
           <a:lstStyle/>
           <a:p>
-            <a:pPr marL="0" marR="0" lvl="0" indent="0" algn="l" defTabSz="457200" rtl="0" eaLnBrk="1" fontAlgn="auto" latinLnBrk="0" hangingPunct="1">
+            <a:pPr marL="0" marR="0" lvl="0" indent="0" algn="ctr" defTabSz="457200" rtl="0" eaLnBrk="1" fontAlgn="auto" latinLnBrk="0" hangingPunct="1">
               <a:lnSpc>
                 <a:spcPct val="100000"/>
               </a:lnSpc>
@@ -11216,8 +10797,8 @@
         </p:nvSpPr>
         <p:spPr>
           <a:xfrm>
-            <a:off x="417834" y="2481374"/>
-            <a:ext cx="8308331" cy="830997"/>
+            <a:off x="124656" y="1999443"/>
+            <a:ext cx="8866944" cy="830997"/>
           </a:xfrm>
           <a:prstGeom prst="rect">
             <a:avLst/>
@@ -11262,57 +10843,7 @@
                 <a:ea typeface="游ゴシック" panose="020B0400000000000000" pitchFamily="50" charset="-128"/>
                 <a:cs typeface="+mn-cs"/>
               </a:rPr>
-              <a:t>従来の静的な研究では、データを測定した時点での</a:t>
-            </a:r>
-            <a:endParaRPr kumimoji="1" lang="en-US" altLang="ja-JP" sz="2400" b="0" i="0" u="none" strike="noStrike" kern="1200" cap="none" spc="0" normalizeH="0" baseline="0" noProof="0" dirty="0">
-              <a:ln>
-                <a:noFill/>
-              </a:ln>
-              <a:solidFill>
-                <a:prstClr val="black"/>
-              </a:solidFill>
-              <a:effectLst/>
-              <a:uLnTx/>
-              <a:uFillTx/>
-              <a:latin typeface="Calibri" panose="020F0502020204030204"/>
-              <a:ea typeface="游ゴシック" panose="020B0400000000000000" pitchFamily="50" charset="-128"/>
-              <a:cs typeface="+mn-cs"/>
-            </a:endParaRPr>
-          </a:p>
-          <a:p>
-            <a:pPr marL="0" marR="0" lvl="0" indent="0" algn="l" defTabSz="457200" rtl="0" eaLnBrk="1" fontAlgn="auto" latinLnBrk="0" hangingPunct="1">
-              <a:lnSpc>
-                <a:spcPct val="100000"/>
-              </a:lnSpc>
-              <a:spcBef>
-                <a:spcPts val="0"/>
-              </a:spcBef>
-              <a:spcAft>
-                <a:spcPts val="0"/>
-              </a:spcAft>
-              <a:buClrTx/>
-              <a:buSzTx/>
-              <a:buFontTx/>
-              <a:buNone/>
-              <a:tabLst/>
-              <a:defRPr/>
-            </a:pPr>
-            <a:r>
-              <a:rPr kumimoji="1" lang="ja-JP" altLang="en-US" sz="2400" b="0" i="0" u="none" strike="noStrike" kern="1200" cap="none" spc="0" normalizeH="0" baseline="0" noProof="0" dirty="0">
-                <a:ln>
-                  <a:noFill/>
-                </a:ln>
-                <a:solidFill>
-                  <a:prstClr val="black"/>
-                </a:solidFill>
-                <a:effectLst/>
-                <a:uLnTx/>
-                <a:uFillTx/>
-                <a:latin typeface="Calibri" panose="020F0502020204030204"/>
-                <a:ea typeface="游ゴシック" panose="020B0400000000000000" pitchFamily="50" charset="-128"/>
-                <a:cs typeface="+mn-cs"/>
-              </a:rPr>
-              <a:t>特徴しか得られない。</a:t>
+              <a:t>従来研究では、データを測定した時点での特徴しか得られない。</a:t>
             </a:r>
             <a:r>
               <a:rPr kumimoji="1" lang="en-US" altLang="ja-JP" sz="2400" b="0" i="0" u="none" strike="noStrike" kern="1200" cap="none" spc="0" normalizeH="0" baseline="0" noProof="0" dirty="0">
@@ -11362,7 +10893,7 @@
         </p:nvSpPr>
         <p:spPr>
           <a:xfrm rot="5400000">
-            <a:off x="3976334" y="3200160"/>
+            <a:off x="4120885" y="2733074"/>
             <a:ext cx="595908" cy="603458"/>
           </a:xfrm>
           <a:prstGeom prst="rightArrow">
@@ -11437,8 +10968,8 @@
         </p:nvSpPr>
         <p:spPr>
           <a:xfrm>
-            <a:off x="437598" y="3916229"/>
-            <a:ext cx="7874000" cy="830997"/>
+            <a:off x="0" y="3487495"/>
+            <a:ext cx="8991600" cy="830997"/>
           </a:xfrm>
           <a:prstGeom prst="rect">
             <a:avLst/>
@@ -11451,7 +10982,7 @@
           </a:bodyPr>
           <a:lstStyle/>
           <a:p>
-            <a:pPr marL="0" marR="0" lvl="0" indent="0" algn="l" defTabSz="457200" rtl="0" eaLnBrk="1" fontAlgn="auto" latinLnBrk="0" hangingPunct="1">
+            <a:pPr marL="0" marR="0" lvl="0" indent="0" algn="ctr" defTabSz="457200" rtl="0" eaLnBrk="1" fontAlgn="auto" latinLnBrk="0" hangingPunct="1">
               <a:lnSpc>
                 <a:spcPct val="100000"/>
               </a:lnSpc>
@@ -11501,7 +11032,7 @@
             </a:endParaRPr>
           </a:p>
           <a:p>
-            <a:pPr marL="0" marR="0" lvl="0" indent="0" algn="l" defTabSz="457200" rtl="0" eaLnBrk="1" fontAlgn="auto" latinLnBrk="0" hangingPunct="1">
+            <a:pPr marL="0" marR="0" lvl="0" indent="0" algn="ctr" defTabSz="457200" rtl="0" eaLnBrk="1" fontAlgn="auto" latinLnBrk="0" hangingPunct="1">
               <a:lnSpc>
                 <a:spcPct val="100000"/>
               </a:lnSpc>
@@ -11552,7 +11083,7 @@
         </p:nvSpPr>
         <p:spPr>
           <a:xfrm rot="5400000">
-            <a:off x="3972316" y="4767409"/>
+            <a:off x="4120885" y="4743268"/>
             <a:ext cx="595908" cy="603458"/>
           </a:xfrm>
           <a:prstGeom prst="rightArrow">
@@ -11627,8 +11158,8 @@
         </p:nvSpPr>
         <p:spPr>
           <a:xfrm>
-            <a:off x="322327" y="5368504"/>
-            <a:ext cx="7874000" cy="461665"/>
+            <a:off x="2886" y="5473317"/>
+            <a:ext cx="9141114" cy="461665"/>
           </a:xfrm>
           <a:prstGeom prst="rect">
             <a:avLst/>
@@ -11641,39 +11172,17 @@
           </a:bodyPr>
           <a:lstStyle/>
           <a:p>
-            <a:pPr marL="0" marR="0" lvl="0" indent="0" algn="l" defTabSz="457200" rtl="0" eaLnBrk="1" fontAlgn="auto" latinLnBrk="0" hangingPunct="1">
-              <a:lnSpc>
-                <a:spcPct val="100000"/>
-              </a:lnSpc>
-              <a:spcBef>
-                <a:spcPts val="0"/>
-              </a:spcBef>
-              <a:spcAft>
-                <a:spcPts val="0"/>
-              </a:spcAft>
-              <a:buClrTx/>
-              <a:buSzTx/>
-              <a:buFontTx/>
-              <a:buNone/>
-              <a:tabLst/>
+            <a:pPr lvl="0" algn="ctr" defTabSz="457200">
               <a:defRPr/>
             </a:pPr>
             <a:r>
-              <a:rPr kumimoji="1" lang="ja-JP" altLang="en-US" sz="2400" b="1" i="0" u="none" strike="noStrike" kern="1200" cap="none" spc="0" normalizeH="0" baseline="0" noProof="0" dirty="0">
-                <a:ln>
-                  <a:noFill/>
-                </a:ln>
+              <a:rPr lang="ja-JP" altLang="en-US" sz="2400" b="1" dirty="0">
                 <a:solidFill>
-                  <a:srgbClr val="FF0000"/>
+                  <a:prstClr val="black"/>
                 </a:solidFill>
-                <a:effectLst/>
-                <a:uLnTx/>
-                <a:uFillTx/>
-                <a:latin typeface="Calibri" panose="020F0502020204030204"/>
                 <a:ea typeface="游ゴシック" panose="020B0400000000000000" pitchFamily="50" charset="-128"/>
-                <a:cs typeface="+mn-cs"/>
               </a:rPr>
-              <a:t>現在のデータから未来の特徴予測などを実現する</a:t>
+              <a:t>言語データの動的分析手法の確立</a:t>
             </a:r>
             <a:endParaRPr kumimoji="1" lang="en-US" altLang="ja-JP" sz="2400" b="1" i="0" u="none" strike="noStrike" kern="1200" cap="none" spc="0" normalizeH="0" baseline="0" noProof="0" dirty="0">
               <a:ln>
@@ -11705,7 +11214,7 @@
 </p:sld>
 </file>
 
-<file path=ppt/slides/slide6.xml><?xml version="1.0" encoding="utf-8"?>
+<file path=ppt/slides/slide5.xml><?xml version="1.0" encoding="utf-8"?>
 <p:sld xmlns:a="http://schemas.openxmlformats.org/drawingml/2006/main" xmlns:r="http://schemas.openxmlformats.org/officeDocument/2006/relationships" xmlns:p="http://schemas.openxmlformats.org/presentationml/2006/main">
   <p:cSld>
     <p:spTree>
@@ -11772,7 +11281,7 @@
         </p:nvSpPr>
         <p:spPr>
           <a:xfrm>
-            <a:off x="343610" y="5734919"/>
+            <a:off x="243840" y="5183326"/>
             <a:ext cx="7694349" cy="461665"/>
           </a:xfrm>
           <a:prstGeom prst="rect">
@@ -11890,7 +11399,7 @@
         <p:spPr>
           <a:xfrm>
             <a:off x="243840" y="3429000"/>
-            <a:ext cx="8789541" cy="2123658"/>
+            <a:ext cx="8789541" cy="1754326"/>
           </a:xfrm>
           <a:prstGeom prst="rect">
             <a:avLst/>
@@ -11935,7 +11444,51 @@
                 <a:ea typeface="游ゴシック" panose="020B0400000000000000" pitchFamily="50" charset="-128"/>
                 <a:cs typeface="+mn-cs"/>
               </a:rPr>
-              <a:t>形態素解析により、大臣の発言データを品詞ごとに分類</a:t>
+              <a:t>形態素解析</a:t>
+            </a:r>
+            <a:r>
+              <a:rPr lang="ja-JP" altLang="en-US" sz="2400" dirty="0">
+                <a:solidFill>
+                  <a:prstClr val="black"/>
+                </a:solidFill>
+                <a:latin typeface="Calibri" panose="020F0502020204030204"/>
+                <a:ea typeface="游ゴシック" panose="020B0400000000000000" pitchFamily="50" charset="-128"/>
+              </a:rPr>
+              <a:t>を行い</a:t>
+            </a:r>
+            <a:r>
+              <a:rPr kumimoji="1" lang="ja-JP" altLang="en-US" sz="2400" b="0" i="0" u="none" strike="noStrike" kern="1200" cap="none" spc="0" normalizeH="0" baseline="0" noProof="0" dirty="0" err="1">
+                <a:ln>
+                  <a:noFill/>
+                </a:ln>
+                <a:solidFill>
+                  <a:prstClr val="black"/>
+                </a:solidFill>
+                <a:effectLst/>
+                <a:uLnTx/>
+                <a:uFillTx/>
+                <a:latin typeface="Calibri" panose="020F0502020204030204"/>
+                <a:ea typeface="游ゴシック" panose="020B0400000000000000" pitchFamily="50" charset="-128"/>
+                <a:cs typeface="+mn-cs"/>
+              </a:rPr>
+              <a:t>、</a:t>
+            </a:r>
+            <a:r>
+              <a:rPr kumimoji="1" lang="ja-JP" altLang="en-US" sz="2400" b="0" i="0" u="none" strike="noStrike" kern="1200" cap="none" spc="0" normalizeH="0" baseline="0" noProof="0" dirty="0">
+                <a:ln>
+                  <a:noFill/>
+                </a:ln>
+                <a:solidFill>
+                  <a:prstClr val="black"/>
+                </a:solidFill>
+                <a:effectLst/>
+                <a:uLnTx/>
+                <a:uFillTx/>
+                <a:latin typeface="Calibri" panose="020F0502020204030204"/>
+                <a:ea typeface="游ゴシック" panose="020B0400000000000000" pitchFamily="50" charset="-128"/>
+                <a:cs typeface="+mn-cs"/>
+              </a:rPr>
+              <a:t>大臣の発言データを品詞ごとに分類</a:t>
             </a:r>
             <a:endParaRPr kumimoji="1" lang="en-US" altLang="ja-JP" sz="2400" b="0" i="0" u="none" strike="noStrike" kern="1200" cap="none" spc="0" normalizeH="0" baseline="0" noProof="0" dirty="0">
               <a:ln>
@@ -11985,9 +11538,33 @@
                 <a:ea typeface="游ゴシック" panose="020B0400000000000000" pitchFamily="50" charset="-128"/>
                 <a:cs typeface="+mn-cs"/>
               </a:rPr>
-              <a:t>内閣支持率データを各大臣の任期で区切り、時系列的特徴が大きい部分の発言データに着目</a:t>
-            </a:r>
-            <a:endParaRPr kumimoji="1" lang="en-US" altLang="ja-JP" sz="2400" b="0" i="0" u="none" strike="noStrike" kern="1200" cap="none" spc="0" normalizeH="0" baseline="0" noProof="0" dirty="0">
+              <a:t>内閣支持率データを時系列解析し、変動が大きい部分に着目</a:t>
+            </a:r>
+            <a:endParaRPr lang="en-US" altLang="ja-JP" sz="2400" dirty="0">
+              <a:solidFill>
+                <a:prstClr val="black"/>
+              </a:solidFill>
+              <a:latin typeface="Calibri" panose="020F0502020204030204"/>
+              <a:ea typeface="游ゴシック" panose="020B0400000000000000" pitchFamily="50" charset="-128"/>
+            </a:endParaRPr>
+          </a:p>
+          <a:p>
+            <a:pPr marR="0" lvl="0" algn="l" defTabSz="457200" rtl="0" eaLnBrk="1" fontAlgn="auto" latinLnBrk="0" hangingPunct="1">
+              <a:lnSpc>
+                <a:spcPct val="100000"/>
+              </a:lnSpc>
+              <a:spcBef>
+                <a:spcPts val="0"/>
+              </a:spcBef>
+              <a:spcAft>
+                <a:spcPts val="0"/>
+              </a:spcAft>
+              <a:buClrTx/>
+              <a:buSzTx/>
+              <a:tabLst/>
+              <a:defRPr/>
+            </a:pPr>
+            <a:endParaRPr kumimoji="1" lang="ja-JP" altLang="en-US" sz="2400" b="0" i="0" u="none" strike="noStrike" kern="1200" cap="none" spc="0" normalizeH="0" baseline="0" noProof="0" dirty="0">
               <a:ln>
                 <a:noFill/>
               </a:ln>
@@ -12002,42 +11579,6 @@
               <a:cs typeface="+mn-cs"/>
             </a:endParaRPr>
           </a:p>
-          <a:p>
-            <a:pPr marL="342900" marR="0" lvl="0" indent="-342900" algn="l" defTabSz="457200" rtl="0" eaLnBrk="1" fontAlgn="auto" latinLnBrk="0" hangingPunct="1">
-              <a:lnSpc>
-                <a:spcPct val="100000"/>
-              </a:lnSpc>
-              <a:spcBef>
-                <a:spcPts val="0"/>
-              </a:spcBef>
-              <a:spcAft>
-                <a:spcPts val="0"/>
-              </a:spcAft>
-              <a:buClrTx/>
-              <a:buSzTx/>
-              <a:buFont typeface="+mj-lt"/>
-              <a:buAutoNum type="arabicPeriod"/>
-              <a:tabLst/>
-              <a:defRPr/>
-            </a:pPr>
-            <a:r>
-              <a:rPr kumimoji="1" lang="ja-JP" altLang="en-US" sz="2400" b="0" i="0" u="none" strike="noStrike" kern="1200" cap="none" spc="0" normalizeH="0" baseline="0" noProof="0" dirty="0">
-                <a:ln>
-                  <a:noFill/>
-                </a:ln>
-                <a:solidFill>
-                  <a:prstClr val="black"/>
-                </a:solidFill>
-                <a:effectLst/>
-                <a:uLnTx/>
-                <a:uFillTx/>
-                <a:latin typeface="Calibri" panose="020F0502020204030204"/>
-                <a:ea typeface="游ゴシック" panose="020B0400000000000000" pitchFamily="50" charset="-128"/>
-                <a:cs typeface="+mn-cs"/>
-              </a:rPr>
-              <a:t>文書内重要度から特徴語を同定する</a:t>
-            </a:r>
-          </a:p>
         </p:txBody>
       </p:sp>
     </p:spTree>
@@ -12053,7 +11594,7 @@
 </p:sld>
 </file>
 
-<file path=ppt/slides/slide7.xml><?xml version="1.0" encoding="utf-8"?>
+<file path=ppt/slides/slide6.xml><?xml version="1.0" encoding="utf-8"?>
 <p:sld xmlns:a="http://schemas.openxmlformats.org/drawingml/2006/main" xmlns:r="http://schemas.openxmlformats.org/officeDocument/2006/relationships" xmlns:p="http://schemas.openxmlformats.org/presentationml/2006/main">
   <p:cSld>
     <p:spTree>
@@ -12328,7 +11869,14 @@
               </a:r>
               <a:r>
                 <a:rPr kumimoji="1" lang="ja-JP" altLang="en-US" b="1" dirty="0"/>
-                <a:t>に出てくる特徴語</a:t>
+                <a:t>に出てくる</a:t>
+              </a:r>
+              <a:endParaRPr kumimoji="1" lang="en-US" altLang="ja-JP" b="1" dirty="0"/>
+            </a:p>
+            <a:p>
+              <a:r>
+                <a:rPr kumimoji="1" lang="ja-JP" altLang="en-US" b="1" dirty="0"/>
+                <a:t>特徴語</a:t>
               </a:r>
             </a:p>
           </p:txBody>
@@ -12368,19 +11916,26 @@
             <a:p>
               <a:r>
                 <a:rPr kumimoji="1" lang="ja-JP" altLang="en-US" b="1" dirty="0"/>
-                <a:t>支持率が上がる</a:t>
+                <a:t>支持率が上がっている</a:t>
               </a:r>
               <a:r>
-                <a:rPr kumimoji="1" lang="ja-JP" altLang="en-US" b="1" dirty="0">
+                <a:rPr lang="ja-JP" altLang="en-US" b="1" dirty="0">
                   <a:solidFill>
                     <a:srgbClr val="FF0000"/>
                   </a:solidFill>
                 </a:rPr>
-                <a:t>途中</a:t>
+                <a:t>最中</a:t>
               </a:r>
               <a:r>
                 <a:rPr kumimoji="1" lang="ja-JP" altLang="en-US" b="1" dirty="0"/>
-                <a:t>に出てくる特徴語</a:t>
+                <a:t>に</a:t>
+              </a:r>
+              <a:endParaRPr kumimoji="1" lang="en-US" altLang="ja-JP" b="1" dirty="0"/>
+            </a:p>
+            <a:p>
+              <a:r>
+                <a:rPr kumimoji="1" lang="ja-JP" altLang="en-US" b="1" dirty="0"/>
+                <a:t>出てくる特徴語</a:t>
               </a:r>
             </a:p>
           </p:txBody>
@@ -12432,7 +11987,14 @@
               </a:r>
               <a:r>
                 <a:rPr kumimoji="1" lang="ja-JP" altLang="en-US" b="1" dirty="0"/>
-                <a:t>に出てくる特徴語</a:t>
+                <a:t>に出てくる</a:t>
+              </a:r>
+              <a:endParaRPr kumimoji="1" lang="en-US" altLang="ja-JP" b="1" dirty="0"/>
+            </a:p>
+            <a:p>
+              <a:r>
+                <a:rPr kumimoji="1" lang="ja-JP" altLang="en-US" b="1" dirty="0"/>
+                <a:t>特徴語</a:t>
               </a:r>
             </a:p>
           </p:txBody>
@@ -12698,14 +12260,14 @@
           <a:p>
             <a:r>
               <a:rPr kumimoji="1" lang="ja-JP" altLang="en-US" sz="2400" b="1" dirty="0"/>
-              <a:t>特徴語の収集期間をずらし、支持率を上昇を予兆する発言などを</a:t>
+              <a:t>支持率の変動によって言語データをグループ分けし、</a:t>
             </a:r>
             <a:endParaRPr kumimoji="1" lang="en-US" altLang="ja-JP" sz="2400" b="1" dirty="0"/>
           </a:p>
           <a:p>
             <a:r>
               <a:rPr kumimoji="1" lang="ja-JP" altLang="en-US" sz="2400" b="1" dirty="0"/>
-              <a:t>グルーピングする</a:t>
+              <a:t>支持率の上下により、発言に特徴が出るか検証する</a:t>
             </a:r>
             <a:endParaRPr kumimoji="1" lang="en-US" altLang="ja-JP" sz="2400" b="1" dirty="0"/>
           </a:p>
@@ -12724,7 +12286,7 @@
 </p:sld>
 </file>
 
-<file path=ppt/slides/slide8.xml><?xml version="1.0" encoding="utf-8"?>
+<file path=ppt/slides/slide7.xml><?xml version="1.0" encoding="utf-8"?>
 <p:sld xmlns:a="http://schemas.openxmlformats.org/drawingml/2006/main" xmlns:r="http://schemas.openxmlformats.org/officeDocument/2006/relationships" xmlns:p="http://schemas.openxmlformats.org/presentationml/2006/main">
   <p:cSld>
     <p:spTree>
@@ -12798,9 +12360,35 @@
             </a:pPr>
             <a:r>
               <a:rPr kumimoji="1" lang="ja-JP" altLang="en-US" sz="2800" dirty="0"/>
-              <a:t>月毎に安倍総理大臣の答弁データを収集</a:t>
+              <a:t>データの収集</a:t>
             </a:r>
             <a:endParaRPr kumimoji="1" lang="en-US" altLang="ja-JP" sz="2800" dirty="0"/>
+          </a:p>
+          <a:p>
+            <a:pPr lvl="1">
+              <a:buFont typeface="Wingdings" panose="05000000000000000000" pitchFamily="2" charset="2"/>
+              <a:buChar char="l"/>
+            </a:pPr>
+            <a:r>
+              <a:rPr lang="ja-JP" altLang="en-US" sz="2400" dirty="0"/>
+              <a:t>月毎に安倍総理大臣の答弁データを集める</a:t>
+            </a:r>
+            <a:endParaRPr lang="en-US" altLang="ja-JP" sz="2400" dirty="0"/>
+          </a:p>
+          <a:p>
+            <a:pPr lvl="1">
+              <a:buFont typeface="Wingdings" panose="05000000000000000000" pitchFamily="2" charset="2"/>
+              <a:buChar char="l"/>
+            </a:pPr>
+            <a:r>
+              <a:rPr kumimoji="1" lang="en-US" altLang="ja-JP" sz="2400" dirty="0"/>
+              <a:t>NHK</a:t>
+            </a:r>
+            <a:r>
+              <a:rPr kumimoji="1" lang="ja-JP" altLang="en-US" sz="2400" dirty="0"/>
+              <a:t>のサイトから内閣支持率を収集</a:t>
+            </a:r>
+            <a:endParaRPr kumimoji="1" lang="en-US" altLang="ja-JP" sz="2600" dirty="0"/>
           </a:p>
           <a:p>
             <a:pPr>
@@ -12809,17 +12397,20 @@
             </a:pPr>
             <a:r>
               <a:rPr lang="ja-JP" altLang="en-US" sz="2800" dirty="0"/>
-              <a:t>支持率が増えた</a:t>
-            </a:r>
-            <a:r>
-              <a:rPr lang="en-US" altLang="ja-JP" sz="2800" dirty="0"/>
-              <a:t>/</a:t>
-            </a:r>
-            <a:r>
-              <a:rPr lang="ja-JP" altLang="en-US" sz="2800" dirty="0"/>
-              <a:t>落ちた月のデータをグルーピング</a:t>
-            </a:r>
-            <a:endParaRPr lang="en-US" altLang="ja-JP" sz="2600" dirty="0"/>
+              <a:t>データのグルーピング</a:t>
+            </a:r>
+            <a:endParaRPr lang="en-US" altLang="ja-JP" sz="2800" dirty="0"/>
+          </a:p>
+          <a:p>
+            <a:pPr lvl="1">
+              <a:buFont typeface="Wingdings" panose="05000000000000000000" pitchFamily="2" charset="2"/>
+              <a:buChar char="l"/>
+            </a:pPr>
+            <a:r>
+              <a:rPr lang="ja-JP" altLang="en-US" sz="2400" dirty="0"/>
+              <a:t>支持率が上下するタイミング毎にデータを纏める</a:t>
+            </a:r>
+            <a:endParaRPr lang="en-US" altLang="ja-JP" sz="2400" dirty="0"/>
           </a:p>
           <a:p>
             <a:pPr>
@@ -12838,10 +12429,18 @@
               <a:buChar char="l"/>
             </a:pPr>
             <a:r>
-              <a:rPr kumimoji="1" lang="ja-JP" altLang="en-US" sz="2600" dirty="0"/>
-              <a:t>機械学習を行い両者を判別できるか</a:t>
-            </a:r>
-            <a:endParaRPr kumimoji="1" lang="en-US" altLang="ja-JP" sz="2600" dirty="0"/>
+              <a:rPr kumimoji="1" lang="ja-JP" altLang="en-US" sz="2400" dirty="0"/>
+              <a:t>機械学習を行い</a:t>
+            </a:r>
+            <a:r>
+              <a:rPr lang="ja-JP" altLang="en-US" sz="2400" dirty="0"/>
+              <a:t>、支持率の上下により言語データ</a:t>
+            </a:r>
+            <a:r>
+              <a:rPr kumimoji="1" lang="ja-JP" altLang="en-US" sz="2400" dirty="0"/>
+              <a:t>を判別できるか</a:t>
+            </a:r>
+            <a:endParaRPr kumimoji="1" lang="en-US" altLang="ja-JP" sz="2400" dirty="0"/>
           </a:p>
           <a:p>
             <a:pPr lvl="1">
@@ -12849,10 +12448,10 @@
               <a:buChar char="l"/>
             </a:pPr>
             <a:r>
-              <a:rPr lang="ja-JP" altLang="en-US" sz="2600" dirty="0"/>
-              <a:t>頻出単語を確認し、特徴分析</a:t>
-            </a:r>
-            <a:endParaRPr lang="en-US" altLang="ja-JP" sz="2600" dirty="0"/>
+              <a:rPr lang="ja-JP" altLang="en-US" sz="2400" dirty="0"/>
+              <a:t>頻出単語を確認し、特徴語を分析</a:t>
+            </a:r>
+            <a:endParaRPr lang="en-US" altLang="ja-JP" sz="2400" dirty="0"/>
           </a:p>
           <a:p>
             <a:pPr lvl="1">
@@ -12860,10 +12459,10 @@
               <a:buChar char="l"/>
             </a:pPr>
             <a:r>
-              <a:rPr lang="ja-JP" altLang="en-US" sz="2600" dirty="0"/>
+              <a:rPr lang="ja-JP" altLang="en-US" sz="2400" dirty="0"/>
               <a:t>接続詞の順接・逆接の使用頻度の確認</a:t>
             </a:r>
-            <a:endParaRPr lang="en-US" altLang="ja-JP" sz="2600" dirty="0"/>
+            <a:endParaRPr lang="en-US" altLang="ja-JP" sz="2400" dirty="0"/>
           </a:p>
         </p:txBody>
       </p:sp>
@@ -12880,7 +12479,7 @@
 </p:sld>
 </file>
 
-<file path=ppt/slides/slide9.xml><?xml version="1.0" encoding="utf-8"?>
+<file path=ppt/slides/slide8.xml><?xml version="1.0" encoding="utf-8"?>
 <p:sld xmlns:a="http://schemas.openxmlformats.org/drawingml/2006/main" xmlns:r="http://schemas.openxmlformats.org/officeDocument/2006/relationships" xmlns:p="http://schemas.openxmlformats.org/presentationml/2006/main">
   <p:cSld>
     <p:spTree>
@@ -13989,6 +13588,472 @@
     <p:extLst>
       <p:ext uri="{BB962C8B-B14F-4D97-AF65-F5344CB8AC3E}">
         <p14:creationId xmlns:p14="http://schemas.microsoft.com/office/powerpoint/2010/main" val="3103479167"/>
+      </p:ext>
+    </p:extLst>
+  </p:cSld>
+  <p:clrMapOvr>
+    <a:masterClrMapping/>
+  </p:clrMapOvr>
+</p:sld>
+</file>
+
+<file path=ppt/slides/slide9.xml><?xml version="1.0" encoding="utf-8"?>
+<p:sld xmlns:a="http://schemas.openxmlformats.org/drawingml/2006/main" xmlns:r="http://schemas.openxmlformats.org/officeDocument/2006/relationships" xmlns:p="http://schemas.openxmlformats.org/presentationml/2006/main">
+  <p:cSld>
+    <p:spTree>
+      <p:nvGrpSpPr>
+        <p:cNvPr id="1" name=""/>
+        <p:cNvGrpSpPr/>
+        <p:nvPr/>
+      </p:nvGrpSpPr>
+      <p:grpSpPr>
+        <a:xfrm>
+          <a:off x="0" y="0"/>
+          <a:ext cx="0" cy="0"/>
+          <a:chOff x="0" y="0"/>
+          <a:chExt cx="0" cy="0"/>
+        </a:xfrm>
+      </p:grpSpPr>
+      <p:sp>
+        <p:nvSpPr>
+          <p:cNvPr id="5" name="タイトル 4">
+            <a:extLst>
+              <a:ext uri="{FF2B5EF4-FFF2-40B4-BE49-F238E27FC236}">
+                <a16:creationId xmlns:a16="http://schemas.microsoft.com/office/drawing/2014/main" id="{5F6173A6-3DEB-47BF-A785-55C2FE7C3154}"/>
+              </a:ext>
+            </a:extLst>
+          </p:cNvPr>
+          <p:cNvSpPr>
+            <a:spLocks noGrp="1"/>
+          </p:cNvSpPr>
+          <p:nvPr>
+            <p:ph type="title"/>
+          </p:nvPr>
+        </p:nvSpPr>
+        <p:spPr/>
+        <p:txBody>
+          <a:bodyPr>
+            <a:normAutofit/>
+          </a:bodyPr>
+          <a:lstStyle/>
+          <a:p>
+            <a:r>
+              <a:rPr lang="ja-JP" altLang="en-US" dirty="0"/>
+              <a:t>データのグルーピング方法</a:t>
+            </a:r>
+          </a:p>
+        </p:txBody>
+      </p:sp>
+      <p:pic>
+        <p:nvPicPr>
+          <p:cNvPr id="13" name="コンテンツ プレースホルダー 12">
+            <a:extLst>
+              <a:ext uri="{FF2B5EF4-FFF2-40B4-BE49-F238E27FC236}">
+                <a16:creationId xmlns:a16="http://schemas.microsoft.com/office/drawing/2014/main" id="{1B9A43DE-B636-414E-BFFE-47D7FA3C4C78}"/>
+              </a:ext>
+            </a:extLst>
+          </p:cNvPr>
+          <p:cNvPicPr>
+            <a:picLocks noGrp="1" noChangeAspect="1"/>
+          </p:cNvPicPr>
+          <p:nvPr>
+            <p:ph idx="1"/>
+          </p:nvPr>
+        </p:nvPicPr>
+        <p:blipFill rotWithShape="1">
+          <a:blip r:embed="rId2"/>
+          <a:srcRect b="31811"/>
+          <a:stretch/>
+        </p:blipFill>
+        <p:spPr>
+          <a:xfrm>
+            <a:off x="139700" y="1087410"/>
+            <a:ext cx="8864600" cy="1315131"/>
+          </a:xfrm>
+          <a:prstGeom prst="rect">
+            <a:avLst/>
+          </a:prstGeom>
+        </p:spPr>
+      </p:pic>
+      <p:sp>
+        <p:nvSpPr>
+          <p:cNvPr id="16" name="矢印: 下 15">
+            <a:extLst>
+              <a:ext uri="{FF2B5EF4-FFF2-40B4-BE49-F238E27FC236}">
+                <a16:creationId xmlns:a16="http://schemas.microsoft.com/office/drawing/2014/main" id="{CB9EA1FD-D845-4C7C-9531-28C117590949}"/>
+              </a:ext>
+            </a:extLst>
+          </p:cNvPr>
+          <p:cNvSpPr/>
+          <p:nvPr/>
+        </p:nvSpPr>
+        <p:spPr>
+          <a:xfrm rot="5400000">
+            <a:off x="4853531" y="1310921"/>
+            <a:ext cx="255030" cy="588676"/>
+          </a:xfrm>
+          <a:prstGeom prst="downArrow">
+            <a:avLst/>
+          </a:prstGeom>
+        </p:spPr>
+        <p:style>
+          <a:lnRef idx="2">
+            <a:schemeClr val="accent1">
+              <a:shade val="50000"/>
+            </a:schemeClr>
+          </a:lnRef>
+          <a:fillRef idx="1">
+            <a:schemeClr val="accent1"/>
+          </a:fillRef>
+          <a:effectRef idx="0">
+            <a:schemeClr val="accent1"/>
+          </a:effectRef>
+          <a:fontRef idx="minor">
+            <a:schemeClr val="lt1"/>
+          </a:fontRef>
+        </p:style>
+        <p:txBody>
+          <a:bodyPr rtlCol="0" anchor="ctr"/>
+          <a:lstStyle/>
+          <a:p>
+            <a:pPr algn="ctr"/>
+            <a:endParaRPr kumimoji="1" lang="ja-JP" altLang="en-US"/>
+          </a:p>
+        </p:txBody>
+      </p:sp>
+      <p:sp>
+        <p:nvSpPr>
+          <p:cNvPr id="17" name="テキスト ボックス 16">
+            <a:extLst>
+              <a:ext uri="{FF2B5EF4-FFF2-40B4-BE49-F238E27FC236}">
+                <a16:creationId xmlns:a16="http://schemas.microsoft.com/office/drawing/2014/main" id="{1816BA9B-8C82-46A8-8F27-87AD37233AAD}"/>
+              </a:ext>
+            </a:extLst>
+          </p:cNvPr>
+          <p:cNvSpPr txBox="1"/>
+          <p:nvPr/>
+        </p:nvSpPr>
+        <p:spPr>
+          <a:xfrm>
+            <a:off x="189471" y="3331016"/>
+            <a:ext cx="6875584" cy="1200329"/>
+          </a:xfrm>
+          <a:prstGeom prst="rect">
+            <a:avLst/>
+          </a:prstGeom>
+          <a:noFill/>
+        </p:spPr>
+        <p:txBody>
+          <a:bodyPr wrap="square" rtlCol="0">
+            <a:spAutoFit/>
+          </a:bodyPr>
+          <a:lstStyle/>
+          <a:p>
+            <a:r>
+              <a:rPr lang="ja-JP" altLang="en-US" dirty="0"/>
+              <a:t>支持率の上下により各月の係数を決定</a:t>
+            </a:r>
+            <a:endParaRPr lang="en-US" altLang="ja-JP" dirty="0"/>
+          </a:p>
+          <a:p>
+            <a:r>
+              <a:rPr lang="ja-JP" altLang="en-US" dirty="0"/>
+              <a:t>遅行係数</a:t>
+            </a:r>
+            <a:r>
+              <a:rPr lang="en-US" altLang="ja-JP" dirty="0"/>
+              <a:t>…</a:t>
+            </a:r>
+            <a:r>
+              <a:rPr lang="ja-JP" altLang="en-US" dirty="0"/>
+              <a:t>支持率が上下した値を翌月の発言につける</a:t>
+            </a:r>
+            <a:endParaRPr lang="en-US" altLang="ja-JP" dirty="0"/>
+          </a:p>
+          <a:p>
+            <a:r>
+              <a:rPr lang="ja-JP" altLang="en-US" dirty="0"/>
+              <a:t>現在係数</a:t>
+            </a:r>
+            <a:r>
+              <a:rPr lang="en-US" altLang="ja-JP" dirty="0"/>
+              <a:t>…</a:t>
+            </a:r>
+            <a:r>
+              <a:rPr lang="ja-JP" altLang="en-US" dirty="0"/>
+              <a:t>上下した値を当月の発言につける</a:t>
+            </a:r>
+            <a:endParaRPr lang="en-US" altLang="ja-JP" dirty="0"/>
+          </a:p>
+          <a:p>
+            <a:r>
+              <a:rPr lang="ja-JP" altLang="en-US" dirty="0"/>
+              <a:t>先行係数</a:t>
+            </a:r>
+            <a:r>
+              <a:rPr lang="en-US" altLang="ja-JP" dirty="0"/>
+              <a:t>…</a:t>
+            </a:r>
+            <a:r>
+              <a:rPr lang="ja-JP" altLang="en-US" dirty="0"/>
+              <a:t>上下した値を前月の発言につける</a:t>
+            </a:r>
+            <a:endParaRPr lang="en-US" altLang="ja-JP" dirty="0"/>
+          </a:p>
+        </p:txBody>
+      </p:sp>
+      <p:pic>
+        <p:nvPicPr>
+          <p:cNvPr id="18" name="図 17">
+            <a:extLst>
+              <a:ext uri="{FF2B5EF4-FFF2-40B4-BE49-F238E27FC236}">
+                <a16:creationId xmlns:a16="http://schemas.microsoft.com/office/drawing/2014/main" id="{A15172F7-1296-4C5A-91DB-6517D03C7170}"/>
+              </a:ext>
+            </a:extLst>
+          </p:cNvPr>
+          <p:cNvPicPr>
+            <a:picLocks noChangeAspect="1"/>
+          </p:cNvPicPr>
+          <p:nvPr/>
+        </p:nvPicPr>
+        <p:blipFill>
+          <a:blip r:embed="rId3"/>
+          <a:stretch>
+            <a:fillRect/>
+          </a:stretch>
+        </p:blipFill>
+        <p:spPr>
+          <a:xfrm>
+            <a:off x="5599755" y="3730412"/>
+            <a:ext cx="3354774" cy="2453307"/>
+          </a:xfrm>
+          <a:prstGeom prst="rect">
+            <a:avLst/>
+          </a:prstGeom>
+        </p:spPr>
+      </p:pic>
+      <p:sp>
+        <p:nvSpPr>
+          <p:cNvPr id="19" name="矢印: 下 18">
+            <a:extLst>
+              <a:ext uri="{FF2B5EF4-FFF2-40B4-BE49-F238E27FC236}">
+                <a16:creationId xmlns:a16="http://schemas.microsoft.com/office/drawing/2014/main" id="{89E1A9A0-4ABD-449B-9BA7-97ED3B268292}"/>
+              </a:ext>
+            </a:extLst>
+          </p:cNvPr>
+          <p:cNvSpPr/>
+          <p:nvPr/>
+        </p:nvSpPr>
+        <p:spPr>
+          <a:xfrm>
+            <a:off x="1916723" y="4531345"/>
+            <a:ext cx="527539" cy="401140"/>
+          </a:xfrm>
+          <a:prstGeom prst="downArrow">
+            <a:avLst/>
+          </a:prstGeom>
+        </p:spPr>
+        <p:style>
+          <a:lnRef idx="2">
+            <a:schemeClr val="accent1">
+              <a:shade val="50000"/>
+            </a:schemeClr>
+          </a:lnRef>
+          <a:fillRef idx="1">
+            <a:schemeClr val="accent1"/>
+          </a:fillRef>
+          <a:effectRef idx="0">
+            <a:schemeClr val="accent1"/>
+          </a:effectRef>
+          <a:fontRef idx="minor">
+            <a:schemeClr val="lt1"/>
+          </a:fontRef>
+        </p:style>
+        <p:txBody>
+          <a:bodyPr rtlCol="0" anchor="ctr"/>
+          <a:lstStyle/>
+          <a:p>
+            <a:pPr algn="ctr"/>
+            <a:endParaRPr kumimoji="1" lang="ja-JP" altLang="en-US"/>
+          </a:p>
+        </p:txBody>
+      </p:sp>
+      <p:sp>
+        <p:nvSpPr>
+          <p:cNvPr id="20" name="テキスト ボックス 19">
+            <a:extLst>
+              <a:ext uri="{FF2B5EF4-FFF2-40B4-BE49-F238E27FC236}">
+                <a16:creationId xmlns:a16="http://schemas.microsoft.com/office/drawing/2014/main" id="{31B5C119-102B-4F25-9A78-98F745CCC3E5}"/>
+              </a:ext>
+            </a:extLst>
+          </p:cNvPr>
+          <p:cNvSpPr txBox="1"/>
+          <p:nvPr/>
+        </p:nvSpPr>
+        <p:spPr>
+          <a:xfrm>
+            <a:off x="430823" y="5187462"/>
+            <a:ext cx="4589585" cy="646331"/>
+          </a:xfrm>
+          <a:prstGeom prst="rect">
+            <a:avLst/>
+          </a:prstGeom>
+          <a:noFill/>
+        </p:spPr>
+        <p:txBody>
+          <a:bodyPr wrap="square" rtlCol="0">
+            <a:spAutoFit/>
+          </a:bodyPr>
+          <a:lstStyle/>
+          <a:p>
+            <a:r>
+              <a:rPr lang="ja-JP" altLang="en-US" dirty="0"/>
+              <a:t>各係数が上昇・降下した月のデータを値が</a:t>
+            </a:r>
+            <a:endParaRPr lang="en-US" altLang="ja-JP" dirty="0"/>
+          </a:p>
+          <a:p>
+            <a:r>
+              <a:rPr lang="ja-JP" altLang="en-US" dirty="0"/>
+              <a:t>大きい順に</a:t>
+            </a:r>
+            <a:r>
+              <a:rPr lang="en-US" altLang="ja-JP" dirty="0"/>
+              <a:t>10</a:t>
+            </a:r>
+            <a:r>
+              <a:rPr lang="ja-JP" altLang="en-US" dirty="0"/>
+              <a:t>個をデータセットとした</a:t>
+            </a:r>
+            <a:endParaRPr kumimoji="1" lang="ja-JP" altLang="en-US" dirty="0"/>
+          </a:p>
+        </p:txBody>
+      </p:sp>
+      <p:pic>
+        <p:nvPicPr>
+          <p:cNvPr id="11" name="コンテンツ プレースホルダー 12">
+            <a:extLst>
+              <a:ext uri="{FF2B5EF4-FFF2-40B4-BE49-F238E27FC236}">
+                <a16:creationId xmlns:a16="http://schemas.microsoft.com/office/drawing/2014/main" id="{A911F7EA-6655-43F7-A3F2-FE5A9731B531}"/>
+              </a:ext>
+            </a:extLst>
+          </p:cNvPr>
+          <p:cNvPicPr>
+            <a:picLocks noChangeAspect="1"/>
+          </p:cNvPicPr>
+          <p:nvPr/>
+        </p:nvPicPr>
+        <p:blipFill rotWithShape="1">
+          <a:blip r:embed="rId2"/>
+          <a:srcRect t="50000"/>
+          <a:stretch/>
+        </p:blipFill>
+        <p:spPr>
+          <a:xfrm>
+            <a:off x="139700" y="1718919"/>
+            <a:ext cx="8864600" cy="964333"/>
+          </a:xfrm>
+          <a:prstGeom prst="rect">
+            <a:avLst/>
+          </a:prstGeom>
+        </p:spPr>
+      </p:pic>
+      <p:sp>
+        <p:nvSpPr>
+          <p:cNvPr id="12" name="矢印: 下 11">
+            <a:extLst>
+              <a:ext uri="{FF2B5EF4-FFF2-40B4-BE49-F238E27FC236}">
+                <a16:creationId xmlns:a16="http://schemas.microsoft.com/office/drawing/2014/main" id="{8F579916-4A01-4DE9-A3D7-B09C07DF982D}"/>
+              </a:ext>
+            </a:extLst>
+          </p:cNvPr>
+          <p:cNvSpPr/>
+          <p:nvPr/>
+        </p:nvSpPr>
+        <p:spPr>
+          <a:xfrm rot="4110838">
+            <a:off x="4871059" y="1692936"/>
+            <a:ext cx="255030" cy="634611"/>
+          </a:xfrm>
+          <a:prstGeom prst="downArrow">
+            <a:avLst/>
+          </a:prstGeom>
+        </p:spPr>
+        <p:style>
+          <a:lnRef idx="2">
+            <a:schemeClr val="accent1">
+              <a:shade val="50000"/>
+            </a:schemeClr>
+          </a:lnRef>
+          <a:fillRef idx="1">
+            <a:schemeClr val="accent1"/>
+          </a:fillRef>
+          <a:effectRef idx="0">
+            <a:schemeClr val="accent1"/>
+          </a:effectRef>
+          <a:fontRef idx="minor">
+            <a:schemeClr val="lt1"/>
+          </a:fontRef>
+        </p:style>
+        <p:txBody>
+          <a:bodyPr rtlCol="0" anchor="ctr"/>
+          <a:lstStyle/>
+          <a:p>
+            <a:pPr algn="ctr"/>
+            <a:endParaRPr kumimoji="1" lang="ja-JP" altLang="en-US"/>
+          </a:p>
+        </p:txBody>
+      </p:sp>
+      <p:sp>
+        <p:nvSpPr>
+          <p:cNvPr id="21" name="矢印: 下 20">
+            <a:extLst>
+              <a:ext uri="{FF2B5EF4-FFF2-40B4-BE49-F238E27FC236}">
+                <a16:creationId xmlns:a16="http://schemas.microsoft.com/office/drawing/2014/main" id="{FB3E9DBF-5D0E-4A0E-BDFC-A1625AECEEEF}"/>
+              </a:ext>
+            </a:extLst>
+          </p:cNvPr>
+          <p:cNvSpPr/>
+          <p:nvPr/>
+        </p:nvSpPr>
+        <p:spPr>
+          <a:xfrm rot="3978882">
+            <a:off x="3838428" y="2051810"/>
+            <a:ext cx="242721" cy="701463"/>
+          </a:xfrm>
+          <a:prstGeom prst="downArrow">
+            <a:avLst/>
+          </a:prstGeom>
+        </p:spPr>
+        <p:style>
+          <a:lnRef idx="2">
+            <a:schemeClr val="accent1">
+              <a:shade val="50000"/>
+            </a:schemeClr>
+          </a:lnRef>
+          <a:fillRef idx="1">
+            <a:schemeClr val="accent1"/>
+          </a:fillRef>
+          <a:effectRef idx="0">
+            <a:schemeClr val="accent1"/>
+          </a:effectRef>
+          <a:fontRef idx="minor">
+            <a:schemeClr val="lt1"/>
+          </a:fontRef>
+        </p:style>
+        <p:txBody>
+          <a:bodyPr rtlCol="0" anchor="ctr"/>
+          <a:lstStyle/>
+          <a:p>
+            <a:pPr algn="ctr"/>
+            <a:endParaRPr kumimoji="1" lang="ja-JP" altLang="en-US" dirty="0"/>
+          </a:p>
+        </p:txBody>
+      </p:sp>
+    </p:spTree>
+    <p:extLst>
+      <p:ext uri="{BB962C8B-B14F-4D97-AF65-F5344CB8AC3E}">
+        <p14:creationId xmlns:p14="http://schemas.microsoft.com/office/powerpoint/2010/main" val="3973278057"/>
       </p:ext>
     </p:extLst>
   </p:cSld>

</xml_diff>